<commit_message>
maj suite à formation
</commit_message>
<xml_diff>
--- a/01_python/cours/01_introduction générale.pptx
+++ b/01_python/cours/01_introduction générale.pptx
@@ -5,44 +5,46 @@
     <p:sldMasterId id="2147483743" r:id="rId1"/>
   </p:sldMasterIdLst>
   <p:notesMasterIdLst>
-    <p:notesMasterId r:id="rId15"/>
+    <p:notesMasterId r:id="rId17"/>
   </p:notesMasterIdLst>
   <p:handoutMasterIdLst>
-    <p:handoutMasterId r:id="rId16"/>
+    <p:handoutMasterId r:id="rId18"/>
   </p:handoutMasterIdLst>
   <p:sldIdLst>
     <p:sldId id="256" r:id="rId2"/>
     <p:sldId id="257" r:id="rId3"/>
-    <p:sldId id="258" r:id="rId4"/>
-    <p:sldId id="259" r:id="rId5"/>
-    <p:sldId id="260" r:id="rId6"/>
-    <p:sldId id="261" r:id="rId7"/>
-    <p:sldId id="264" r:id="rId8"/>
-    <p:sldId id="262" r:id="rId9"/>
-    <p:sldId id="263" r:id="rId10"/>
-    <p:sldId id="265" r:id="rId11"/>
-    <p:sldId id="266" r:id="rId12"/>
-    <p:sldId id="267" r:id="rId13"/>
-    <p:sldId id="268" r:id="rId14"/>
+    <p:sldId id="269" r:id="rId4"/>
+    <p:sldId id="270" r:id="rId5"/>
+    <p:sldId id="271" r:id="rId6"/>
+    <p:sldId id="258" r:id="rId7"/>
+    <p:sldId id="260" r:id="rId8"/>
+    <p:sldId id="261" r:id="rId9"/>
+    <p:sldId id="264" r:id="rId10"/>
+    <p:sldId id="262" r:id="rId11"/>
+    <p:sldId id="263" r:id="rId12"/>
+    <p:sldId id="265" r:id="rId13"/>
+    <p:sldId id="266" r:id="rId14"/>
+    <p:sldId id="267" r:id="rId15"/>
+    <p:sldId id="268" r:id="rId16"/>
   </p:sldIdLst>
   <p:sldSz cx="12192000" cy="6858000"/>
   <p:notesSz cx="9601200" cy="7315200"/>
   <p:embeddedFontLst>
     <p:embeddedFont>
       <p:font typeface="French Script MT" panose="03020402040607040605" pitchFamily="66" charset="0"/>
-      <p:regular r:id="rId17"/>
+      <p:regular r:id="rId19"/>
     </p:embeddedFont>
     <p:embeddedFont>
       <p:font typeface="Georgia" panose="02040502050405020303" pitchFamily="18" charset="0"/>
-      <p:regular r:id="rId18"/>
-      <p:bold r:id="rId19"/>
-      <p:italic r:id="rId20"/>
-      <p:boldItalic r:id="rId21"/>
+      <p:regular r:id="rId20"/>
+      <p:bold r:id="rId21"/>
+      <p:italic r:id="rId22"/>
+      <p:boldItalic r:id="rId23"/>
     </p:embeddedFont>
     <p:embeddedFont>
       <p:font typeface="Tahoma" panose="020B0604030504040204" pitchFamily="34" charset="0"/>
-      <p:regular r:id="rId22"/>
-      <p:bold r:id="rId23"/>
+      <p:regular r:id="rId24"/>
+      <p:bold r:id="rId25"/>
     </p:embeddedFont>
   </p:embeddedFontLst>
   <p:defaultTextStyle>
@@ -1629,14 +1631,14 @@
           <a:effectLst/>
           <a:extLst>
             <a:ext uri="{909E8E84-426E-40dd-AFC4-6F175D3DCCD1}">
-              <a14:hiddenFill xmlns="" xmlns:a14="http://schemas.microsoft.com/office/drawing/2010/main">
+              <a14:hiddenFill xmlns:a14="http://schemas.microsoft.com/office/drawing/2010/main" xmlns="">
                 <a:solidFill>
                   <a:schemeClr val="accent1"/>
                 </a:solidFill>
               </a14:hiddenFill>
             </a:ext>
             <a:ext uri="{91240B29-F687-4f45-9708-019B960494DF}">
-              <a14:hiddenLine xmlns="" xmlns:a14="http://schemas.microsoft.com/office/drawing/2010/main" w="9525">
+              <a14:hiddenLine xmlns:a14="http://schemas.microsoft.com/office/drawing/2010/main" xmlns="" w="9525">
                 <a:solidFill>
                   <a:schemeClr val="tx1"/>
                 </a:solidFill>
@@ -1646,7 +1648,7 @@
               </a14:hiddenLine>
             </a:ext>
             <a:ext uri="{AF507438-7753-43e0-B8FC-AC1667EBCBE1}">
-              <a14:hiddenEffects xmlns="" xmlns:a14="http://schemas.microsoft.com/office/drawing/2010/main">
+              <a14:hiddenEffects xmlns:a14="http://schemas.microsoft.com/office/drawing/2010/main" xmlns="">
                 <a:effectLst>
                   <a:outerShdw blurRad="63500" dist="38099" dir="2700000" algn="ctr" rotWithShape="0">
                     <a:schemeClr val="bg2">
@@ -1657,7 +1659,7 @@
               </a14:hiddenEffects>
             </a:ext>
             <a:ext uri="{FAA26D3D-D897-4be2-8F04-BA451C77F1D7}">
-              <ma14:placeholderFlag xmlns="" xmlns:ma14="http://schemas.microsoft.com/office/mac/drawingml/2011/main" val="1"/>
+              <ma14:placeholderFlag xmlns:ma14="http://schemas.microsoft.com/office/mac/drawingml/2011/main" xmlns="" val="1"/>
             </a:ext>
           </a:extLst>
         </p:spPr>
@@ -1702,14 +1704,14 @@
           <a:effectLst/>
           <a:extLst>
             <a:ext uri="{909E8E84-426E-40dd-AFC4-6F175D3DCCD1}">
-              <a14:hiddenFill xmlns="" xmlns:a14="http://schemas.microsoft.com/office/drawing/2010/main">
+              <a14:hiddenFill xmlns:a14="http://schemas.microsoft.com/office/drawing/2010/main" xmlns="">
                 <a:solidFill>
                   <a:schemeClr val="accent1"/>
                 </a:solidFill>
               </a14:hiddenFill>
             </a:ext>
             <a:ext uri="{91240B29-F687-4f45-9708-019B960494DF}">
-              <a14:hiddenLine xmlns="" xmlns:a14="http://schemas.microsoft.com/office/drawing/2010/main" w="9525">
+              <a14:hiddenLine xmlns:a14="http://schemas.microsoft.com/office/drawing/2010/main" xmlns="" w="9525">
                 <a:solidFill>
                   <a:schemeClr val="tx1"/>
                 </a:solidFill>
@@ -1719,7 +1721,7 @@
               </a14:hiddenLine>
             </a:ext>
             <a:ext uri="{AF507438-7753-43e0-B8FC-AC1667EBCBE1}">
-              <a14:hiddenEffects xmlns="" xmlns:a14="http://schemas.microsoft.com/office/drawing/2010/main">
+              <a14:hiddenEffects xmlns:a14="http://schemas.microsoft.com/office/drawing/2010/main" xmlns="">
                 <a:effectLst>
                   <a:outerShdw blurRad="63500" dist="38099" dir="2700000" algn="ctr" rotWithShape="0">
                     <a:schemeClr val="bg2">
@@ -1730,7 +1732,7 @@
               </a14:hiddenEffects>
             </a:ext>
             <a:ext uri="{FAA26D3D-D897-4be2-8F04-BA451C77F1D7}">
-              <ma14:placeholderFlag xmlns="" xmlns:ma14="http://schemas.microsoft.com/office/mac/drawingml/2011/main" val="1"/>
+              <ma14:placeholderFlag xmlns:ma14="http://schemas.microsoft.com/office/mac/drawingml/2011/main" xmlns="" val="1"/>
             </a:ext>
           </a:extLst>
         </p:spPr>
@@ -1775,14 +1777,14 @@
           <a:effectLst/>
           <a:extLst>
             <a:ext uri="{909E8E84-426E-40dd-AFC4-6F175D3DCCD1}">
-              <a14:hiddenFill xmlns="" xmlns:a14="http://schemas.microsoft.com/office/drawing/2010/main">
+              <a14:hiddenFill xmlns:a14="http://schemas.microsoft.com/office/drawing/2010/main" xmlns="">
                 <a:solidFill>
                   <a:schemeClr val="accent1"/>
                 </a:solidFill>
               </a14:hiddenFill>
             </a:ext>
             <a:ext uri="{91240B29-F687-4f45-9708-019B960494DF}">
-              <a14:hiddenLine xmlns="" xmlns:a14="http://schemas.microsoft.com/office/drawing/2010/main" w="9525">
+              <a14:hiddenLine xmlns:a14="http://schemas.microsoft.com/office/drawing/2010/main" xmlns="" w="9525">
                 <a:solidFill>
                   <a:schemeClr val="tx1"/>
                 </a:solidFill>
@@ -1792,7 +1794,7 @@
               </a14:hiddenLine>
             </a:ext>
             <a:ext uri="{AF507438-7753-43e0-B8FC-AC1667EBCBE1}">
-              <a14:hiddenEffects xmlns="" xmlns:a14="http://schemas.microsoft.com/office/drawing/2010/main">
+              <a14:hiddenEffects xmlns:a14="http://schemas.microsoft.com/office/drawing/2010/main" xmlns="">
                 <a:effectLst>
                   <a:outerShdw blurRad="63500" dist="38099" dir="2700000" algn="ctr" rotWithShape="0">
                     <a:schemeClr val="bg2">
@@ -1803,7 +1805,7 @@
               </a14:hiddenEffects>
             </a:ext>
             <a:ext uri="{FAA26D3D-D897-4be2-8F04-BA451C77F1D7}">
-              <ma14:placeholderFlag xmlns="" xmlns:ma14="http://schemas.microsoft.com/office/mac/drawingml/2011/main" val="1"/>
+              <ma14:placeholderFlag xmlns:ma14="http://schemas.microsoft.com/office/mac/drawingml/2011/main" xmlns="" val="1"/>
             </a:ext>
           </a:extLst>
         </p:spPr>
@@ -1848,14 +1850,14 @@
           <a:effectLst/>
           <a:extLst>
             <a:ext uri="{909E8E84-426E-40dd-AFC4-6F175D3DCCD1}">
-              <a14:hiddenFill xmlns="" xmlns:a14="http://schemas.microsoft.com/office/drawing/2010/main">
+              <a14:hiddenFill xmlns:a14="http://schemas.microsoft.com/office/drawing/2010/main" xmlns="">
                 <a:solidFill>
                   <a:schemeClr val="accent1"/>
                 </a:solidFill>
               </a14:hiddenFill>
             </a:ext>
             <a:ext uri="{91240B29-F687-4f45-9708-019B960494DF}">
-              <a14:hiddenLine xmlns="" xmlns:a14="http://schemas.microsoft.com/office/drawing/2010/main" w="9525">
+              <a14:hiddenLine xmlns:a14="http://schemas.microsoft.com/office/drawing/2010/main" xmlns="" w="9525">
                 <a:solidFill>
                   <a:schemeClr val="tx1"/>
                 </a:solidFill>
@@ -1865,7 +1867,7 @@
               </a14:hiddenLine>
             </a:ext>
             <a:ext uri="{AF507438-7753-43e0-B8FC-AC1667EBCBE1}">
-              <a14:hiddenEffects xmlns="" xmlns:a14="http://schemas.microsoft.com/office/drawing/2010/main">
+              <a14:hiddenEffects xmlns:a14="http://schemas.microsoft.com/office/drawing/2010/main" xmlns="">
                 <a:effectLst>
                   <a:outerShdw blurRad="63500" dist="38099" dir="2700000" algn="ctr" rotWithShape="0">
                     <a:schemeClr val="bg2">
@@ -1876,7 +1878,7 @@
               </a14:hiddenEffects>
             </a:ext>
             <a:ext uri="{FAA26D3D-D897-4be2-8F04-BA451C77F1D7}">
-              <ma14:placeholderFlag xmlns="" xmlns:ma14="http://schemas.microsoft.com/office/mac/drawingml/2011/main" val="1"/>
+              <ma14:placeholderFlag xmlns:ma14="http://schemas.microsoft.com/office/mac/drawingml/2011/main" xmlns="" val="1"/>
             </a:ext>
           </a:extLst>
         </p:spPr>
@@ -1962,14 +1964,14 @@
           <a:effectLst/>
           <a:extLst>
             <a:ext uri="{909E8E84-426E-40dd-AFC4-6F175D3DCCD1}">
-              <a14:hiddenFill xmlns="" xmlns:a14="http://schemas.microsoft.com/office/drawing/2010/main">
+              <a14:hiddenFill xmlns:a14="http://schemas.microsoft.com/office/drawing/2010/main" xmlns="">
                 <a:solidFill>
                   <a:schemeClr val="accent1"/>
                 </a:solidFill>
               </a14:hiddenFill>
             </a:ext>
             <a:ext uri="{91240B29-F687-4f45-9708-019B960494DF}">
-              <a14:hiddenLine xmlns="" xmlns:a14="http://schemas.microsoft.com/office/drawing/2010/main" w="9525">
+              <a14:hiddenLine xmlns:a14="http://schemas.microsoft.com/office/drawing/2010/main" xmlns="" w="9525">
                 <a:solidFill>
                   <a:schemeClr val="tx1"/>
                 </a:solidFill>
@@ -1979,7 +1981,7 @@
               </a14:hiddenLine>
             </a:ext>
             <a:ext uri="{AF507438-7753-43e0-B8FC-AC1667EBCBE1}">
-              <a14:hiddenEffects xmlns="" xmlns:a14="http://schemas.microsoft.com/office/drawing/2010/main">
+              <a14:hiddenEffects xmlns:a14="http://schemas.microsoft.com/office/drawing/2010/main" xmlns="">
                 <a:effectLst>
                   <a:outerShdw blurRad="63500" dist="38099" dir="2700000" algn="ctr" rotWithShape="0">
                     <a:schemeClr val="bg2">
@@ -1990,7 +1992,7 @@
               </a14:hiddenEffects>
             </a:ext>
             <a:ext uri="{FAA26D3D-D897-4be2-8F04-BA451C77F1D7}">
-              <ma14:placeholderFlag xmlns="" xmlns:ma14="http://schemas.microsoft.com/office/mac/drawingml/2011/main" val="1"/>
+              <ma14:placeholderFlag xmlns:ma14="http://schemas.microsoft.com/office/mac/drawingml/2011/main" xmlns="" val="1"/>
             </a:ext>
           </a:extLst>
         </p:spPr>
@@ -2035,14 +2037,14 @@
           <a:effectLst/>
           <a:extLst>
             <a:ext uri="{909E8E84-426E-40dd-AFC4-6F175D3DCCD1}">
-              <a14:hiddenFill xmlns="" xmlns:a14="http://schemas.microsoft.com/office/drawing/2010/main">
+              <a14:hiddenFill xmlns:a14="http://schemas.microsoft.com/office/drawing/2010/main" xmlns="">
                 <a:solidFill>
                   <a:schemeClr val="accent1"/>
                 </a:solidFill>
               </a14:hiddenFill>
             </a:ext>
             <a:ext uri="{91240B29-F687-4f45-9708-019B960494DF}">
-              <a14:hiddenLine xmlns="" xmlns:a14="http://schemas.microsoft.com/office/drawing/2010/main" w="9525">
+              <a14:hiddenLine xmlns:a14="http://schemas.microsoft.com/office/drawing/2010/main" xmlns="" w="9525">
                 <a:solidFill>
                   <a:schemeClr val="tx1"/>
                 </a:solidFill>
@@ -2052,7 +2054,7 @@
               </a14:hiddenLine>
             </a:ext>
             <a:ext uri="{AF507438-7753-43e0-B8FC-AC1667EBCBE1}">
-              <a14:hiddenEffects xmlns="" xmlns:a14="http://schemas.microsoft.com/office/drawing/2010/main">
+              <a14:hiddenEffects xmlns:a14="http://schemas.microsoft.com/office/drawing/2010/main" xmlns="">
                 <a:effectLst>
                   <a:outerShdw blurRad="63500" dist="38099" dir="2700000" algn="ctr" rotWithShape="0">
                     <a:schemeClr val="bg2">
@@ -2063,7 +2065,7 @@
               </a14:hiddenEffects>
             </a:ext>
             <a:ext uri="{FAA26D3D-D897-4be2-8F04-BA451C77F1D7}">
-              <ma14:placeholderFlag xmlns="" xmlns:ma14="http://schemas.microsoft.com/office/mac/drawingml/2011/main" val="1"/>
+              <ma14:placeholderFlag xmlns:ma14="http://schemas.microsoft.com/office/mac/drawingml/2011/main" xmlns="" val="1"/>
             </a:ext>
           </a:extLst>
         </p:spPr>
@@ -2113,7 +2115,7 @@
           <a:effectLst/>
           <a:extLst>
             <a:ext uri="{AF507438-7753-43e0-B8FC-AC1667EBCBE1}">
-              <a14:hiddenEffects xmlns="" xmlns:a14="http://schemas.microsoft.com/office/drawing/2010/main">
+              <a14:hiddenEffects xmlns:a14="http://schemas.microsoft.com/office/drawing/2010/main" xmlns="">
                 <a:effectLst>
                   <a:outerShdw blurRad="63500" dist="38099" dir="2700000" algn="ctr" rotWithShape="0">
                     <a:srgbClr val="000000">
@@ -2124,7 +2126,7 @@
               </a14:hiddenEffects>
             </a:ext>
             <a:ext uri="{53640926-AAD7-44d8-BBD7-CCE9431645EC}">
-              <a14:shadowObscured xmlns="" xmlns:a14="http://schemas.microsoft.com/office/drawing/2010/main" val="1"/>
+              <a14:shadowObscured xmlns:a14="http://schemas.microsoft.com/office/drawing/2010/main" xmlns="" val="1"/>
             </a:ext>
           </a:extLst>
         </p:spPr>
@@ -2154,14 +2156,14 @@
           <a:effectLst/>
           <a:extLst>
             <a:ext uri="{909E8E84-426E-40dd-AFC4-6F175D3DCCD1}">
-              <a14:hiddenFill xmlns="" xmlns:a14="http://schemas.microsoft.com/office/drawing/2010/main">
+              <a14:hiddenFill xmlns:a14="http://schemas.microsoft.com/office/drawing/2010/main" xmlns="">
                 <a:solidFill>
                   <a:schemeClr val="accent1"/>
                 </a:solidFill>
               </a14:hiddenFill>
             </a:ext>
             <a:ext uri="{91240B29-F687-4f45-9708-019B960494DF}">
-              <a14:hiddenLine xmlns="" xmlns:a14="http://schemas.microsoft.com/office/drawing/2010/main" w="9525">
+              <a14:hiddenLine xmlns:a14="http://schemas.microsoft.com/office/drawing/2010/main" xmlns="" w="9525">
                 <a:solidFill>
                   <a:schemeClr val="tx1"/>
                 </a:solidFill>
@@ -2171,7 +2173,7 @@
               </a14:hiddenLine>
             </a:ext>
             <a:ext uri="{AF507438-7753-43e0-B8FC-AC1667EBCBE1}">
-              <a14:hiddenEffects xmlns="" xmlns:a14="http://schemas.microsoft.com/office/drawing/2010/main">
+              <a14:hiddenEffects xmlns:a14="http://schemas.microsoft.com/office/drawing/2010/main" xmlns="">
                 <a:effectLst>
                   <a:outerShdw blurRad="63500" dist="38099" dir="2700000" algn="ctr" rotWithShape="0">
                     <a:schemeClr val="bg2">
@@ -2182,7 +2184,7 @@
               </a14:hiddenEffects>
             </a:ext>
             <a:ext uri="{FAA26D3D-D897-4be2-8F04-BA451C77F1D7}">
-              <ma14:placeholderFlag xmlns="" xmlns:ma14="http://schemas.microsoft.com/office/mac/drawingml/2011/main" val="1"/>
+              <ma14:placeholderFlag xmlns:ma14="http://schemas.microsoft.com/office/mac/drawingml/2011/main" xmlns="" val="1"/>
             </a:ext>
           </a:extLst>
         </p:spPr>
@@ -2255,14 +2257,14 @@
           <a:effectLst/>
           <a:extLst>
             <a:ext uri="{909E8E84-426E-40dd-AFC4-6F175D3DCCD1}">
-              <a14:hiddenFill xmlns="" xmlns:a14="http://schemas.microsoft.com/office/drawing/2010/main">
+              <a14:hiddenFill xmlns:a14="http://schemas.microsoft.com/office/drawing/2010/main" xmlns="">
                 <a:solidFill>
                   <a:schemeClr val="accent1"/>
                 </a:solidFill>
               </a14:hiddenFill>
             </a:ext>
             <a:ext uri="{91240B29-F687-4f45-9708-019B960494DF}">
-              <a14:hiddenLine xmlns="" xmlns:a14="http://schemas.microsoft.com/office/drawing/2010/main" w="9525">
+              <a14:hiddenLine xmlns:a14="http://schemas.microsoft.com/office/drawing/2010/main" xmlns="" w="9525">
                 <a:solidFill>
                   <a:schemeClr val="tx1"/>
                 </a:solidFill>
@@ -2272,7 +2274,7 @@
               </a14:hiddenLine>
             </a:ext>
             <a:ext uri="{AF507438-7753-43e0-B8FC-AC1667EBCBE1}">
-              <a14:hiddenEffects xmlns="" xmlns:a14="http://schemas.microsoft.com/office/drawing/2010/main">
+              <a14:hiddenEffects xmlns:a14="http://schemas.microsoft.com/office/drawing/2010/main" xmlns="">
                 <a:effectLst>
                   <a:outerShdw blurRad="63500" dist="38099" dir="2700000" algn="ctr" rotWithShape="0">
                     <a:schemeClr val="bg2">
@@ -2283,7 +2285,7 @@
               </a14:hiddenEffects>
             </a:ext>
             <a:ext uri="{FAA26D3D-D897-4be2-8F04-BA451C77F1D7}">
-              <ma14:placeholderFlag xmlns="" xmlns:ma14="http://schemas.microsoft.com/office/mac/drawingml/2011/main" val="1"/>
+              <ma14:placeholderFlag xmlns:ma14="http://schemas.microsoft.com/office/mac/drawingml/2011/main" xmlns="" val="1"/>
             </a:ext>
           </a:extLst>
         </p:spPr>
@@ -2328,14 +2330,14 @@
           <a:effectLst/>
           <a:extLst>
             <a:ext uri="{909E8E84-426E-40dd-AFC4-6F175D3DCCD1}">
-              <a14:hiddenFill xmlns="" xmlns:a14="http://schemas.microsoft.com/office/drawing/2010/main">
+              <a14:hiddenFill xmlns:a14="http://schemas.microsoft.com/office/drawing/2010/main" xmlns="">
                 <a:solidFill>
                   <a:schemeClr val="accent1"/>
                 </a:solidFill>
               </a14:hiddenFill>
             </a:ext>
             <a:ext uri="{91240B29-F687-4f45-9708-019B960494DF}">
-              <a14:hiddenLine xmlns="" xmlns:a14="http://schemas.microsoft.com/office/drawing/2010/main" w="9525">
+              <a14:hiddenLine xmlns:a14="http://schemas.microsoft.com/office/drawing/2010/main" xmlns="" w="9525">
                 <a:solidFill>
                   <a:schemeClr val="tx1"/>
                 </a:solidFill>
@@ -2345,7 +2347,7 @@
               </a14:hiddenLine>
             </a:ext>
             <a:ext uri="{AF507438-7753-43e0-B8FC-AC1667EBCBE1}">
-              <a14:hiddenEffects xmlns="" xmlns:a14="http://schemas.microsoft.com/office/drawing/2010/main">
+              <a14:hiddenEffects xmlns:a14="http://schemas.microsoft.com/office/drawing/2010/main" xmlns="">
                 <a:effectLst>
                   <a:outerShdw blurRad="63500" dist="38099" dir="2700000" algn="ctr" rotWithShape="0">
                     <a:schemeClr val="bg2">
@@ -2356,7 +2358,7 @@
               </a14:hiddenEffects>
             </a:ext>
             <a:ext uri="{FAA26D3D-D897-4be2-8F04-BA451C77F1D7}">
-              <ma14:placeholderFlag xmlns="" xmlns:ma14="http://schemas.microsoft.com/office/mac/drawingml/2011/main" val="1"/>
+              <ma14:placeholderFlag xmlns:ma14="http://schemas.microsoft.com/office/mac/drawingml/2011/main" xmlns="" val="1"/>
             </a:ext>
           </a:extLst>
         </p:spPr>
@@ -5952,7 +5954,7 @@
           <a:p>
             <a:r>
               <a:rPr lang="fr-FR" dirty="0"/>
-              <a:t>Philippe.Renevier@ac-grenoble.fr</a:t>
+              <a:t>Philippe.Renevier-Gonin@ac-grenoble.fr</a:t>
             </a:r>
           </a:p>
         </p:txBody>
@@ -5971,6 +5973,1233 @@
 </file>
 
 <file path=ppt/slides/slide10.xml><?xml version="1.0" encoding="utf-8"?>
+<p:sld xmlns:a="http://schemas.openxmlformats.org/drawingml/2006/main" xmlns:r="http://schemas.openxmlformats.org/officeDocument/2006/relationships" xmlns:p="http://schemas.openxmlformats.org/presentationml/2006/main">
+  <p:cSld>
+    <p:spTree>
+      <p:nvGrpSpPr>
+        <p:cNvPr id="1" name=""/>
+        <p:cNvGrpSpPr/>
+        <p:nvPr/>
+      </p:nvGrpSpPr>
+      <p:grpSpPr>
+        <a:xfrm>
+          <a:off x="0" y="0"/>
+          <a:ext cx="0" cy="0"/>
+          <a:chOff x="0" y="0"/>
+          <a:chExt cx="0" cy="0"/>
+        </a:xfrm>
+      </p:grpSpPr>
+      <p:grpSp>
+        <p:nvGrpSpPr>
+          <p:cNvPr id="43" name="Groupe 42">
+            <a:extLst>
+              <a:ext uri="{FF2B5EF4-FFF2-40B4-BE49-F238E27FC236}">
+                <a16:creationId xmlns:a16="http://schemas.microsoft.com/office/drawing/2014/main" id="{09CD1CE8-BE6F-AEB8-935F-0DD02295151C}"/>
+              </a:ext>
+            </a:extLst>
+          </p:cNvPr>
+          <p:cNvGrpSpPr/>
+          <p:nvPr/>
+        </p:nvGrpSpPr>
+        <p:grpSpPr>
+          <a:xfrm>
+            <a:off x="272903" y="1785657"/>
+            <a:ext cx="7911328" cy="3826419"/>
+            <a:chOff x="272903" y="1785657"/>
+            <a:chExt cx="7911328" cy="3826419"/>
+          </a:xfrm>
+        </p:grpSpPr>
+        <p:sp>
+          <p:nvSpPr>
+            <p:cNvPr id="39" name="Rectangle 38">
+              <a:extLst>
+                <a:ext uri="{FF2B5EF4-FFF2-40B4-BE49-F238E27FC236}">
+                  <a16:creationId xmlns:a16="http://schemas.microsoft.com/office/drawing/2014/main" id="{B17ACE51-668B-405F-CB4A-59A7C065D489}"/>
+                </a:ext>
+              </a:extLst>
+            </p:cNvPr>
+            <p:cNvSpPr/>
+            <p:nvPr/>
+          </p:nvSpPr>
+          <p:spPr>
+            <a:xfrm>
+              <a:off x="335360" y="1785657"/>
+              <a:ext cx="7056782" cy="334163"/>
+            </a:xfrm>
+            <a:prstGeom prst="rect">
+              <a:avLst/>
+            </a:prstGeom>
+          </p:spPr>
+          <p:style>
+            <a:lnRef idx="1">
+              <a:schemeClr val="accent2"/>
+            </a:lnRef>
+            <a:fillRef idx="2">
+              <a:schemeClr val="accent2"/>
+            </a:fillRef>
+            <a:effectRef idx="1">
+              <a:schemeClr val="accent2"/>
+            </a:effectRef>
+            <a:fontRef idx="minor">
+              <a:schemeClr val="dk1"/>
+            </a:fontRef>
+          </p:style>
+          <p:txBody>
+            <a:bodyPr rtlCol="0" anchor="ctr"/>
+            <a:lstStyle/>
+            <a:p>
+              <a:pPr algn="ctr"/>
+              <a:endParaRPr lang="fr-FR"/>
+            </a:p>
+          </p:txBody>
+        </p:sp>
+        <p:sp>
+          <p:nvSpPr>
+            <p:cNvPr id="40" name="Rectangle 39">
+              <a:extLst>
+                <a:ext uri="{FF2B5EF4-FFF2-40B4-BE49-F238E27FC236}">
+                  <a16:creationId xmlns:a16="http://schemas.microsoft.com/office/drawing/2014/main" id="{082A9FCD-6B37-931D-D27D-FC2DDDB320E3}"/>
+                </a:ext>
+              </a:extLst>
+            </p:cNvPr>
+            <p:cNvSpPr/>
+            <p:nvPr/>
+          </p:nvSpPr>
+          <p:spPr>
+            <a:xfrm>
+              <a:off x="331130" y="2731486"/>
+              <a:ext cx="7853101" cy="334163"/>
+            </a:xfrm>
+            <a:prstGeom prst="rect">
+              <a:avLst/>
+            </a:prstGeom>
+          </p:spPr>
+          <p:style>
+            <a:lnRef idx="1">
+              <a:schemeClr val="accent2"/>
+            </a:lnRef>
+            <a:fillRef idx="2">
+              <a:schemeClr val="accent2"/>
+            </a:fillRef>
+            <a:effectRef idx="1">
+              <a:schemeClr val="accent2"/>
+            </a:effectRef>
+            <a:fontRef idx="minor">
+              <a:schemeClr val="dk1"/>
+            </a:fontRef>
+          </p:style>
+          <p:txBody>
+            <a:bodyPr rtlCol="0" anchor="ctr"/>
+            <a:lstStyle/>
+            <a:p>
+              <a:pPr algn="ctr"/>
+              <a:endParaRPr lang="fr-FR"/>
+            </a:p>
+          </p:txBody>
+        </p:sp>
+        <p:sp>
+          <p:nvSpPr>
+            <p:cNvPr id="41" name="Rectangle 40">
+              <a:extLst>
+                <a:ext uri="{FF2B5EF4-FFF2-40B4-BE49-F238E27FC236}">
+                  <a16:creationId xmlns:a16="http://schemas.microsoft.com/office/drawing/2014/main" id="{8EBEB908-687B-E408-4A17-050DA79BC2B1}"/>
+                </a:ext>
+              </a:extLst>
+            </p:cNvPr>
+            <p:cNvSpPr/>
+            <p:nvPr/>
+          </p:nvSpPr>
+          <p:spPr>
+            <a:xfrm>
+              <a:off x="272904" y="4346164"/>
+              <a:ext cx="5613613" cy="334163"/>
+            </a:xfrm>
+            <a:prstGeom prst="rect">
+              <a:avLst/>
+            </a:prstGeom>
+          </p:spPr>
+          <p:style>
+            <a:lnRef idx="1">
+              <a:schemeClr val="accent2"/>
+            </a:lnRef>
+            <a:fillRef idx="2">
+              <a:schemeClr val="accent2"/>
+            </a:fillRef>
+            <a:effectRef idx="1">
+              <a:schemeClr val="accent2"/>
+            </a:effectRef>
+            <a:fontRef idx="minor">
+              <a:schemeClr val="dk1"/>
+            </a:fontRef>
+          </p:style>
+          <p:txBody>
+            <a:bodyPr rtlCol="0" anchor="ctr"/>
+            <a:lstStyle/>
+            <a:p>
+              <a:pPr algn="ctr"/>
+              <a:endParaRPr lang="fr-FR"/>
+            </a:p>
+          </p:txBody>
+        </p:sp>
+        <p:sp>
+          <p:nvSpPr>
+            <p:cNvPr id="42" name="Rectangle 41">
+              <a:extLst>
+                <a:ext uri="{FF2B5EF4-FFF2-40B4-BE49-F238E27FC236}">
+                  <a16:creationId xmlns:a16="http://schemas.microsoft.com/office/drawing/2014/main" id="{44E5CDEE-64B2-DF50-2D05-29695669E717}"/>
+                </a:ext>
+              </a:extLst>
+            </p:cNvPr>
+            <p:cNvSpPr/>
+            <p:nvPr/>
+          </p:nvSpPr>
+          <p:spPr>
+            <a:xfrm>
+              <a:off x="272903" y="5277913"/>
+              <a:ext cx="5613613" cy="334163"/>
+            </a:xfrm>
+            <a:prstGeom prst="rect">
+              <a:avLst/>
+            </a:prstGeom>
+          </p:spPr>
+          <p:style>
+            <a:lnRef idx="1">
+              <a:schemeClr val="accent2"/>
+            </a:lnRef>
+            <a:fillRef idx="2">
+              <a:schemeClr val="accent2"/>
+            </a:fillRef>
+            <a:effectRef idx="1">
+              <a:schemeClr val="accent2"/>
+            </a:effectRef>
+            <a:fontRef idx="minor">
+              <a:schemeClr val="dk1"/>
+            </a:fontRef>
+          </p:style>
+          <p:txBody>
+            <a:bodyPr rtlCol="0" anchor="ctr"/>
+            <a:lstStyle/>
+            <a:p>
+              <a:pPr algn="ctr"/>
+              <a:endParaRPr lang="fr-FR"/>
+            </a:p>
+          </p:txBody>
+        </p:sp>
+      </p:grpSp>
+      <p:sp>
+        <p:nvSpPr>
+          <p:cNvPr id="2" name="Titre 1">
+            <a:extLst>
+              <a:ext uri="{FF2B5EF4-FFF2-40B4-BE49-F238E27FC236}">
+                <a16:creationId xmlns:a16="http://schemas.microsoft.com/office/drawing/2014/main" id="{F3DF8774-D071-A019-761C-998EA92C32A3}"/>
+              </a:ext>
+            </a:extLst>
+          </p:cNvPr>
+          <p:cNvSpPr>
+            <a:spLocks noGrp="1"/>
+          </p:cNvSpPr>
+          <p:nvPr>
+            <p:ph type="title"/>
+          </p:nvPr>
+        </p:nvSpPr>
+        <p:spPr/>
+        <p:txBody>
+          <a:bodyPr>
+            <a:normAutofit/>
+          </a:bodyPr>
+          <a:lstStyle/>
+          <a:p>
+            <a:r>
+              <a:rPr lang="fr-FR" dirty="0"/>
+              <a:t>Spécialisation dans l’informatique</a:t>
+            </a:r>
+            <a:br>
+              <a:rPr lang="fr-FR" dirty="0"/>
+            </a:br>
+            <a:r>
+              <a:rPr lang="fr-FR" sz="2000" dirty="0"/>
+              <a:t>source : https://cnu27.ls2n.fr/nomenclature-thematique-de-la-section-27-du-cnu/</a:t>
+            </a:r>
+            <a:endParaRPr lang="fr-FR" dirty="0"/>
+          </a:p>
+        </p:txBody>
+      </p:sp>
+      <p:sp>
+        <p:nvSpPr>
+          <p:cNvPr id="3" name="Espace réservé du contenu 2">
+            <a:extLst>
+              <a:ext uri="{FF2B5EF4-FFF2-40B4-BE49-F238E27FC236}">
+                <a16:creationId xmlns:a16="http://schemas.microsoft.com/office/drawing/2014/main" id="{85C1C42F-7C28-14D4-3047-0EA1F60582B5}"/>
+              </a:ext>
+            </a:extLst>
+          </p:cNvPr>
+          <p:cNvSpPr>
+            <a:spLocks noGrp="1"/>
+          </p:cNvSpPr>
+          <p:nvPr>
+            <p:ph idx="1"/>
+          </p:nvPr>
+        </p:nvSpPr>
+        <p:spPr>
+          <a:xfrm>
+            <a:off x="260920" y="1825624"/>
+            <a:ext cx="10515600" cy="4915743"/>
+          </a:xfrm>
+        </p:spPr>
+        <p:txBody>
+          <a:bodyPr>
+            <a:normAutofit fontScale="62500" lnSpcReduction="20000"/>
+          </a:bodyPr>
+          <a:lstStyle/>
+          <a:p>
+            <a:r>
+              <a:rPr lang="fr-FR" dirty="0"/>
+              <a:t>Système d’information (Base de données, Web, Web service, cloud, etc.)</a:t>
+            </a:r>
+          </a:p>
+          <a:p>
+            <a:r>
+              <a:rPr lang="fr-FR" dirty="0"/>
+              <a:t>Algorithmique, Recherche Opérationnelle (optimisation, complexité, etc.)</a:t>
+            </a:r>
+          </a:p>
+          <a:p>
+            <a:r>
+              <a:rPr lang="fr-FR" dirty="0"/>
+              <a:t>Informatique fondamentale (théories, informatique quantique, etc.)</a:t>
+            </a:r>
+          </a:p>
+          <a:p>
+            <a:r>
+              <a:rPr lang="fr-FR" dirty="0"/>
+              <a:t>Réseaux (architecture des réseaux, Internet des Objets (IoT), mobilité, cloud, etc.)</a:t>
+            </a:r>
+          </a:p>
+          <a:p>
+            <a:r>
+              <a:rPr lang="fr-FR" dirty="0" err="1"/>
+              <a:t>Bioinformatique</a:t>
+            </a:r>
+            <a:r>
+              <a:rPr lang="fr-FR" dirty="0"/>
+              <a:t> (fouille de données, modèles et simulations, etc.)</a:t>
+            </a:r>
+          </a:p>
+          <a:p>
+            <a:r>
+              <a:rPr lang="fr-FR" dirty="0"/>
+              <a:t>Systèmes Informatiques (système d’exploitation, temps réels, distribués, etc.)</a:t>
+            </a:r>
+          </a:p>
+          <a:p>
+            <a:r>
+              <a:rPr lang="fr-FR" dirty="0"/>
+              <a:t>Génie logiciel (analyse et conception, modèle, tests, architecture logicielle, </a:t>
+            </a:r>
+            <a:r>
+              <a:rPr lang="fr-FR" dirty="0" err="1"/>
+              <a:t>devops</a:t>
+            </a:r>
+            <a:r>
+              <a:rPr lang="fr-FR" dirty="0"/>
+              <a:t>, etc.)</a:t>
+            </a:r>
+          </a:p>
+          <a:p>
+            <a:r>
+              <a:rPr lang="fr-FR" dirty="0"/>
+              <a:t>Intelligence Artificielle (apprentissage, TALN, science des données, etc.)</a:t>
+            </a:r>
+          </a:p>
+          <a:p>
+            <a:r>
+              <a:rPr lang="fr-FR" dirty="0"/>
+              <a:t>Image, Vision/Perception par ordinateur, RA/RV, 3D, etc.</a:t>
+            </a:r>
+          </a:p>
+          <a:p>
+            <a:r>
+              <a:rPr lang="fr-FR" dirty="0"/>
+              <a:t>Communication Humain-Machine (IHM, Environnements informatiques pour l’apprentissage humain, etc.)</a:t>
+            </a:r>
+          </a:p>
+          <a:p>
+            <a:r>
+              <a:rPr lang="fr-FR" dirty="0"/>
+              <a:t>Architecture des machines (processeurs, systèmes de mémoire, systèmes embarqués, etc.)</a:t>
+            </a:r>
+          </a:p>
+          <a:p>
+            <a:r>
+              <a:rPr lang="fr-FR" dirty="0"/>
+              <a:t>Sécurité (cryptographie, protection de la vie privée, etc.)</a:t>
+            </a:r>
+          </a:p>
+          <a:p>
+            <a:r>
+              <a:rPr lang="fr-FR" dirty="0"/>
+              <a:t>Informatique Industrielle</a:t>
+            </a:r>
+          </a:p>
+          <a:p>
+            <a:r>
+              <a:rPr lang="fr-FR" dirty="0"/>
+              <a:t>Modélisation-simulation</a:t>
+            </a:r>
+          </a:p>
+        </p:txBody>
+      </p:sp>
+      <p:sp>
+        <p:nvSpPr>
+          <p:cNvPr id="29" name="Rectangle 28">
+            <a:extLst>
+              <a:ext uri="{FF2B5EF4-FFF2-40B4-BE49-F238E27FC236}">
+                <a16:creationId xmlns:a16="http://schemas.microsoft.com/office/drawing/2014/main" id="{3DD6140F-1C28-5C56-0EB5-039EF468EA9D}"/>
+              </a:ext>
+            </a:extLst>
+          </p:cNvPr>
+          <p:cNvSpPr/>
+          <p:nvPr/>
+        </p:nvSpPr>
+        <p:spPr>
+          <a:xfrm>
+            <a:off x="335360" y="5409220"/>
+            <a:ext cx="72008" cy="72008"/>
+          </a:xfrm>
+          <a:prstGeom prst="rect">
+            <a:avLst/>
+          </a:prstGeom>
+          <a:noFill/>
+          <a:ln>
+            <a:noFill/>
+          </a:ln>
+        </p:spPr>
+        <p:style>
+          <a:lnRef idx="2">
+            <a:schemeClr val="accent1">
+              <a:shade val="15000"/>
+            </a:schemeClr>
+          </a:lnRef>
+          <a:fillRef idx="1">
+            <a:schemeClr val="accent1"/>
+          </a:fillRef>
+          <a:effectRef idx="0">
+            <a:schemeClr val="accent1"/>
+          </a:effectRef>
+          <a:fontRef idx="minor">
+            <a:schemeClr val="lt1"/>
+          </a:fontRef>
+        </p:style>
+        <p:txBody>
+          <a:bodyPr rtlCol="0" anchor="ctr"/>
+          <a:lstStyle/>
+          <a:p>
+            <a:pPr algn="ctr"/>
+            <a:endParaRPr lang="fr-FR"/>
+          </a:p>
+        </p:txBody>
+      </p:sp>
+      <p:sp>
+        <p:nvSpPr>
+          <p:cNvPr id="32" name="Rectangle 31">
+            <a:extLst>
+              <a:ext uri="{FF2B5EF4-FFF2-40B4-BE49-F238E27FC236}">
+                <a16:creationId xmlns:a16="http://schemas.microsoft.com/office/drawing/2014/main" id="{28C2C680-916C-E6AF-696A-D16888215601}"/>
+              </a:ext>
+            </a:extLst>
+          </p:cNvPr>
+          <p:cNvSpPr/>
+          <p:nvPr/>
+        </p:nvSpPr>
+        <p:spPr>
+          <a:xfrm>
+            <a:off x="8400256" y="1623167"/>
+            <a:ext cx="72008" cy="72008"/>
+          </a:xfrm>
+          <a:prstGeom prst="rect">
+            <a:avLst/>
+          </a:prstGeom>
+          <a:noFill/>
+          <a:ln>
+            <a:noFill/>
+          </a:ln>
+        </p:spPr>
+        <p:style>
+          <a:lnRef idx="2">
+            <a:schemeClr val="accent1">
+              <a:shade val="15000"/>
+            </a:schemeClr>
+          </a:lnRef>
+          <a:fillRef idx="1">
+            <a:schemeClr val="accent1"/>
+          </a:fillRef>
+          <a:effectRef idx="0">
+            <a:schemeClr val="accent1"/>
+          </a:effectRef>
+          <a:fontRef idx="minor">
+            <a:schemeClr val="lt1"/>
+          </a:fontRef>
+        </p:style>
+        <p:txBody>
+          <a:bodyPr rtlCol="0" anchor="ctr"/>
+          <a:lstStyle/>
+          <a:p>
+            <a:pPr algn="ctr"/>
+            <a:endParaRPr lang="fr-FR"/>
+          </a:p>
+        </p:txBody>
+      </p:sp>
+      <p:grpSp>
+        <p:nvGrpSpPr>
+          <p:cNvPr id="44" name="Groupe 43">
+            <a:extLst>
+              <a:ext uri="{FF2B5EF4-FFF2-40B4-BE49-F238E27FC236}">
+                <a16:creationId xmlns:a16="http://schemas.microsoft.com/office/drawing/2014/main" id="{637BF198-3698-0B5C-0F01-11C05CAEC444}"/>
+              </a:ext>
+            </a:extLst>
+          </p:cNvPr>
+          <p:cNvGrpSpPr/>
+          <p:nvPr/>
+        </p:nvGrpSpPr>
+        <p:grpSpPr>
+          <a:xfrm>
+            <a:off x="335360" y="1542397"/>
+            <a:ext cx="12169352" cy="3902826"/>
+            <a:chOff x="335360" y="1542397"/>
+            <a:chExt cx="12169352" cy="3902826"/>
+          </a:xfrm>
+        </p:grpSpPr>
+        <p:sp>
+          <p:nvSpPr>
+            <p:cNvPr id="5" name="ZoneTexte 4">
+              <a:extLst>
+                <a:ext uri="{FF2B5EF4-FFF2-40B4-BE49-F238E27FC236}">
+                  <a16:creationId xmlns:a16="http://schemas.microsoft.com/office/drawing/2014/main" id="{7F134015-BBF0-46BD-F05E-99328E35A319}"/>
+                </a:ext>
+              </a:extLst>
+            </p:cNvPr>
+            <p:cNvSpPr txBox="1"/>
+            <p:nvPr/>
+          </p:nvSpPr>
+          <p:spPr>
+            <a:xfrm>
+              <a:off x="8388981" y="1542397"/>
+              <a:ext cx="4115731" cy="1846659"/>
+            </a:xfrm>
+            <a:prstGeom prst="rect">
+              <a:avLst/>
+            </a:prstGeom>
+            <a:noFill/>
+          </p:spPr>
+          <p:txBody>
+            <a:bodyPr wrap="square">
+              <a:spAutoFit/>
+            </a:bodyPr>
+            <a:lstStyle/>
+            <a:p>
+              <a:r>
+                <a:rPr lang="fr-FR" sz="1600" i="1" dirty="0"/>
+                <a:t>Les données structurées et leur traitement</a:t>
+              </a:r>
+            </a:p>
+            <a:p>
+              <a:r>
+                <a:rPr lang="fr-FR" sz="1600" i="1" dirty="0"/>
+                <a:t>Web</a:t>
+              </a:r>
+            </a:p>
+            <a:p>
+              <a:r>
+                <a:rPr lang="fr-FR" sz="1600" i="1" dirty="0"/>
+                <a:t>Localisation, cartographie et mobilité</a:t>
+              </a:r>
+            </a:p>
+            <a:p>
+              <a:r>
+                <a:rPr lang="fr-FR" sz="1600" i="1" dirty="0"/>
+                <a:t>Informatique embarquée et objets connectés</a:t>
+              </a:r>
+            </a:p>
+            <a:p>
+              <a:r>
+                <a:rPr lang="fr-FR" sz="1600" i="1" dirty="0"/>
+                <a:t>Internet</a:t>
+              </a:r>
+            </a:p>
+            <a:p>
+              <a:r>
+                <a:rPr lang="fr-FR" sz="1600" i="1" dirty="0"/>
+                <a:t>Réseaux sociaux</a:t>
+              </a:r>
+            </a:p>
+            <a:p>
+              <a:r>
+                <a:rPr lang="fr-FR" sz="1600" i="1" dirty="0"/>
+                <a:t>La photographie numérique </a:t>
+              </a:r>
+            </a:p>
+          </p:txBody>
+        </p:sp>
+        <p:cxnSp>
+          <p:nvCxnSpPr>
+            <p:cNvPr id="7" name="Connecteur droit avec flèche 6">
+              <a:extLst>
+                <a:ext uri="{FF2B5EF4-FFF2-40B4-BE49-F238E27FC236}">
+                  <a16:creationId xmlns:a16="http://schemas.microsoft.com/office/drawing/2014/main" id="{9F3A33FA-7107-CD30-DAD7-6D4A702EA125}"/>
+                </a:ext>
+              </a:extLst>
+            </p:cNvPr>
+            <p:cNvCxnSpPr>
+              <a:cxnSpLocks/>
+            </p:cNvCxnSpPr>
+            <p:nvPr/>
+          </p:nvCxnSpPr>
+          <p:spPr>
+            <a:xfrm flipH="1">
+              <a:off x="7392144" y="1690688"/>
+              <a:ext cx="1080120" cy="226144"/>
+            </a:xfrm>
+            <a:prstGeom prst="straightConnector1">
+              <a:avLst/>
+            </a:prstGeom>
+            <a:ln w="38100" cap="flat" cmpd="sng" algn="ctr">
+              <a:solidFill>
+                <a:schemeClr val="accent1"/>
+              </a:solidFill>
+              <a:prstDash val="solid"/>
+              <a:round/>
+              <a:headEnd type="none" w="med" len="med"/>
+              <a:tailEnd type="arrow" w="med" len="med"/>
+            </a:ln>
+            <a:effectLst>
+              <a:outerShdw blurRad="50800" dist="38100" dir="2700000" algn="tl" rotWithShape="0">
+                <a:prstClr val="black">
+                  <a:alpha val="40000"/>
+                </a:prstClr>
+              </a:outerShdw>
+            </a:effectLst>
+          </p:spPr>
+          <p:style>
+            <a:lnRef idx="0">
+              <a:scrgbClr r="0" g="0" b="0"/>
+            </a:lnRef>
+            <a:fillRef idx="0">
+              <a:scrgbClr r="0" g="0" b="0"/>
+            </a:fillRef>
+            <a:effectRef idx="0">
+              <a:scrgbClr r="0" g="0" b="0"/>
+            </a:effectRef>
+            <a:fontRef idx="minor">
+              <a:schemeClr val="tx1"/>
+            </a:fontRef>
+          </p:style>
+        </p:cxnSp>
+        <p:cxnSp>
+          <p:nvCxnSpPr>
+            <p:cNvPr id="8" name="Connecteur droit avec flèche 7">
+              <a:extLst>
+                <a:ext uri="{FF2B5EF4-FFF2-40B4-BE49-F238E27FC236}">
+                  <a16:creationId xmlns:a16="http://schemas.microsoft.com/office/drawing/2014/main" id="{7CB9D15E-2EAD-D217-EA6C-C51F42822D75}"/>
+                </a:ext>
+              </a:extLst>
+            </p:cNvPr>
+            <p:cNvCxnSpPr>
+              <a:cxnSpLocks/>
+            </p:cNvCxnSpPr>
+            <p:nvPr/>
+          </p:nvCxnSpPr>
+          <p:spPr>
+            <a:xfrm flipH="1">
+              <a:off x="7596893" y="1984300"/>
+              <a:ext cx="792088" cy="4540"/>
+            </a:xfrm>
+            <a:prstGeom prst="straightConnector1">
+              <a:avLst/>
+            </a:prstGeom>
+            <a:ln w="38100" cap="flat" cmpd="sng" algn="ctr">
+              <a:solidFill>
+                <a:schemeClr val="accent1"/>
+              </a:solidFill>
+              <a:prstDash val="solid"/>
+              <a:round/>
+              <a:headEnd type="none" w="med" len="med"/>
+              <a:tailEnd type="arrow" w="med" len="med"/>
+            </a:ln>
+            <a:effectLst>
+              <a:outerShdw blurRad="50800" dist="38100" dir="2700000" algn="tl" rotWithShape="0">
+                <a:prstClr val="black">
+                  <a:alpha val="40000"/>
+                </a:prstClr>
+              </a:outerShdw>
+            </a:effectLst>
+          </p:spPr>
+          <p:style>
+            <a:lnRef idx="0">
+              <a:scrgbClr r="0" g="0" b="0"/>
+            </a:lnRef>
+            <a:fillRef idx="0">
+              <a:scrgbClr r="0" g="0" b="0"/>
+            </a:fillRef>
+            <a:effectRef idx="0">
+              <a:scrgbClr r="0" g="0" b="0"/>
+            </a:effectRef>
+            <a:fontRef idx="minor">
+              <a:schemeClr val="tx1"/>
+            </a:fontRef>
+          </p:style>
+        </p:cxnSp>
+        <p:cxnSp>
+          <p:nvCxnSpPr>
+            <p:cNvPr id="11" name="Connecteur droit avec flèche 10">
+              <a:extLst>
+                <a:ext uri="{FF2B5EF4-FFF2-40B4-BE49-F238E27FC236}">
+                  <a16:creationId xmlns:a16="http://schemas.microsoft.com/office/drawing/2014/main" id="{179DFE6B-3842-D867-4C33-01CD87C18D2B}"/>
+                </a:ext>
+              </a:extLst>
+            </p:cNvPr>
+            <p:cNvCxnSpPr>
+              <a:cxnSpLocks/>
+            </p:cNvCxnSpPr>
+            <p:nvPr/>
+          </p:nvCxnSpPr>
+          <p:spPr>
+            <a:xfrm flipH="1">
+              <a:off x="7392144" y="2289129"/>
+              <a:ext cx="996837" cy="427341"/>
+            </a:xfrm>
+            <a:prstGeom prst="straightConnector1">
+              <a:avLst/>
+            </a:prstGeom>
+            <a:ln w="38100" cap="flat" cmpd="sng" algn="ctr">
+              <a:solidFill>
+                <a:schemeClr val="accent1"/>
+              </a:solidFill>
+              <a:prstDash val="solid"/>
+              <a:round/>
+              <a:headEnd type="none" w="med" len="med"/>
+              <a:tailEnd type="arrow" w="med" len="med"/>
+            </a:ln>
+            <a:effectLst>
+              <a:outerShdw blurRad="50800" dist="38100" dir="2700000" algn="tl" rotWithShape="0">
+                <a:prstClr val="black">
+                  <a:alpha val="40000"/>
+                </a:prstClr>
+              </a:outerShdw>
+            </a:effectLst>
+          </p:spPr>
+          <p:style>
+            <a:lnRef idx="0">
+              <a:scrgbClr r="0" g="0" b="0"/>
+            </a:lnRef>
+            <a:fillRef idx="0">
+              <a:scrgbClr r="0" g="0" b="0"/>
+            </a:fillRef>
+            <a:effectRef idx="0">
+              <a:scrgbClr r="0" g="0" b="0"/>
+            </a:effectRef>
+            <a:fontRef idx="minor">
+              <a:schemeClr val="tx1"/>
+            </a:fontRef>
+          </p:style>
+        </p:cxnSp>
+        <p:cxnSp>
+          <p:nvCxnSpPr>
+            <p:cNvPr id="16" name="Connecteur droit avec flèche 15">
+              <a:extLst>
+                <a:ext uri="{FF2B5EF4-FFF2-40B4-BE49-F238E27FC236}">
+                  <a16:creationId xmlns:a16="http://schemas.microsoft.com/office/drawing/2014/main" id="{6BB169A0-002B-9475-D530-41327FC74A06}"/>
+                </a:ext>
+              </a:extLst>
+            </p:cNvPr>
+            <p:cNvCxnSpPr>
+              <a:cxnSpLocks/>
+              <a:stCxn id="5" idx="1"/>
+            </p:cNvCxnSpPr>
+            <p:nvPr/>
+          </p:nvCxnSpPr>
+          <p:spPr>
+            <a:xfrm flipH="1">
+              <a:off x="7680176" y="2465727"/>
+              <a:ext cx="708805" cy="315201"/>
+            </a:xfrm>
+            <a:prstGeom prst="straightConnector1">
+              <a:avLst/>
+            </a:prstGeom>
+            <a:ln w="38100" cap="flat" cmpd="sng" algn="ctr">
+              <a:solidFill>
+                <a:schemeClr val="accent1"/>
+              </a:solidFill>
+              <a:prstDash val="solid"/>
+              <a:round/>
+              <a:headEnd type="none" w="med" len="med"/>
+              <a:tailEnd type="arrow" w="med" len="med"/>
+            </a:ln>
+            <a:effectLst>
+              <a:outerShdw blurRad="50800" dist="38100" dir="2700000" algn="tl" rotWithShape="0">
+                <a:prstClr val="black">
+                  <a:alpha val="40000"/>
+                </a:prstClr>
+              </a:outerShdw>
+            </a:effectLst>
+          </p:spPr>
+          <p:style>
+            <a:lnRef idx="0">
+              <a:scrgbClr r="0" g="0" b="0"/>
+            </a:lnRef>
+            <a:fillRef idx="0">
+              <a:scrgbClr r="0" g="0" b="0"/>
+            </a:fillRef>
+            <a:effectRef idx="0">
+              <a:scrgbClr r="0" g="0" b="0"/>
+            </a:effectRef>
+            <a:fontRef idx="minor">
+              <a:schemeClr val="tx1"/>
+            </a:fontRef>
+          </p:style>
+        </p:cxnSp>
+        <p:cxnSp>
+          <p:nvCxnSpPr>
+            <p:cNvPr id="19" name="Connecteur droit avec flèche 18">
+              <a:extLst>
+                <a:ext uri="{FF2B5EF4-FFF2-40B4-BE49-F238E27FC236}">
+                  <a16:creationId xmlns:a16="http://schemas.microsoft.com/office/drawing/2014/main" id="{E88646AD-6B63-232C-877E-E9F101699E58}"/>
+                </a:ext>
+              </a:extLst>
+            </p:cNvPr>
+            <p:cNvCxnSpPr>
+              <a:cxnSpLocks/>
+            </p:cNvCxnSpPr>
+            <p:nvPr/>
+          </p:nvCxnSpPr>
+          <p:spPr>
+            <a:xfrm flipH="1">
+              <a:off x="8034578" y="2716470"/>
+              <a:ext cx="389207" cy="146463"/>
+            </a:xfrm>
+            <a:prstGeom prst="straightConnector1">
+              <a:avLst/>
+            </a:prstGeom>
+            <a:ln w="38100" cap="flat" cmpd="sng" algn="ctr">
+              <a:solidFill>
+                <a:schemeClr val="accent1"/>
+              </a:solidFill>
+              <a:prstDash val="solid"/>
+              <a:round/>
+              <a:headEnd type="none" w="med" len="med"/>
+              <a:tailEnd type="arrow" w="med" len="med"/>
+            </a:ln>
+            <a:effectLst>
+              <a:outerShdw blurRad="50800" dist="38100" dir="2700000" algn="tl" rotWithShape="0">
+                <a:prstClr val="black">
+                  <a:alpha val="40000"/>
+                </a:prstClr>
+              </a:outerShdw>
+            </a:effectLst>
+          </p:spPr>
+          <p:style>
+            <a:lnRef idx="0">
+              <a:scrgbClr r="0" g="0" b="0"/>
+            </a:lnRef>
+            <a:fillRef idx="0">
+              <a:scrgbClr r="0" g="0" b="0"/>
+            </a:fillRef>
+            <a:effectRef idx="0">
+              <a:scrgbClr r="0" g="0" b="0"/>
+            </a:effectRef>
+            <a:fontRef idx="minor">
+              <a:schemeClr val="tx1"/>
+            </a:fontRef>
+          </p:style>
+        </p:cxnSp>
+        <p:cxnSp>
+          <p:nvCxnSpPr>
+            <p:cNvPr id="21" name="Connecteur droit avec flèche 20">
+              <a:extLst>
+                <a:ext uri="{FF2B5EF4-FFF2-40B4-BE49-F238E27FC236}">
+                  <a16:creationId xmlns:a16="http://schemas.microsoft.com/office/drawing/2014/main" id="{E1D5B670-BCD1-F782-7A3C-851C9EE8F890}"/>
+                </a:ext>
+              </a:extLst>
+            </p:cNvPr>
+            <p:cNvCxnSpPr>
+              <a:cxnSpLocks/>
+              <a:endCxn id="29" idx="1"/>
+            </p:cNvCxnSpPr>
+            <p:nvPr/>
+          </p:nvCxnSpPr>
+          <p:spPr>
+            <a:xfrm rot="10800000" flipV="1">
+              <a:off x="335360" y="1658772"/>
+              <a:ext cx="8136906" cy="3786451"/>
+            </a:xfrm>
+            <a:prstGeom prst="bentConnector3">
+              <a:avLst>
+                <a:gd name="adj1" fmla="val 102809"/>
+              </a:avLst>
+            </a:prstGeom>
+            <a:ln w="38100" cap="flat" cmpd="sng" algn="ctr">
+              <a:solidFill>
+                <a:schemeClr val="accent1"/>
+              </a:solidFill>
+              <a:prstDash val="solid"/>
+              <a:round/>
+              <a:headEnd type="none" w="med" len="med"/>
+              <a:tailEnd type="arrow" w="med" len="med"/>
+            </a:ln>
+            <a:effectLst>
+              <a:outerShdw blurRad="50800" dist="38100" dir="2700000" algn="tl" rotWithShape="0">
+                <a:prstClr val="black">
+                  <a:alpha val="40000"/>
+                </a:prstClr>
+              </a:outerShdw>
+            </a:effectLst>
+          </p:spPr>
+          <p:style>
+            <a:lnRef idx="0">
+              <a:scrgbClr r="0" g="0" b="0"/>
+            </a:lnRef>
+            <a:fillRef idx="0">
+              <a:scrgbClr r="0" g="0" b="0"/>
+            </a:fillRef>
+            <a:effectRef idx="0">
+              <a:scrgbClr r="0" g="0" b="0"/>
+            </a:effectRef>
+            <a:fontRef idx="minor">
+              <a:schemeClr val="tx1"/>
+            </a:fontRef>
+          </p:style>
+        </p:cxnSp>
+        <p:cxnSp>
+          <p:nvCxnSpPr>
+            <p:cNvPr id="23" name="Connecteur droit avec flèche 22">
+              <a:extLst>
+                <a:ext uri="{FF2B5EF4-FFF2-40B4-BE49-F238E27FC236}">
+                  <a16:creationId xmlns:a16="http://schemas.microsoft.com/office/drawing/2014/main" id="{ACCF2F1A-9BBA-4350-235E-42159E58D77C}"/>
+                </a:ext>
+              </a:extLst>
+            </p:cNvPr>
+            <p:cNvCxnSpPr>
+              <a:cxnSpLocks/>
+            </p:cNvCxnSpPr>
+            <p:nvPr/>
+          </p:nvCxnSpPr>
+          <p:spPr>
+            <a:xfrm flipH="1">
+              <a:off x="5820370" y="3208269"/>
+              <a:ext cx="2584078" cy="1294281"/>
+            </a:xfrm>
+            <a:prstGeom prst="straightConnector1">
+              <a:avLst/>
+            </a:prstGeom>
+            <a:ln w="38100" cap="flat" cmpd="sng" algn="ctr">
+              <a:solidFill>
+                <a:schemeClr val="accent1"/>
+              </a:solidFill>
+              <a:prstDash val="solid"/>
+              <a:round/>
+              <a:headEnd type="none" w="med" len="med"/>
+              <a:tailEnd type="arrow" w="med" len="med"/>
+            </a:ln>
+            <a:effectLst>
+              <a:outerShdw blurRad="50800" dist="38100" dir="2700000" algn="tl" rotWithShape="0">
+                <a:prstClr val="black">
+                  <a:alpha val="40000"/>
+                </a:prstClr>
+              </a:outerShdw>
+            </a:effectLst>
+          </p:spPr>
+          <p:style>
+            <a:lnRef idx="0">
+              <a:scrgbClr r="0" g="0" b="0"/>
+            </a:lnRef>
+            <a:fillRef idx="0">
+              <a:scrgbClr r="0" g="0" b="0"/>
+            </a:fillRef>
+            <a:effectRef idx="0">
+              <a:scrgbClr r="0" g="0" b="0"/>
+            </a:effectRef>
+            <a:fontRef idx="minor">
+              <a:schemeClr val="tx1"/>
+            </a:fontRef>
+          </p:style>
+        </p:cxnSp>
+        <p:cxnSp>
+          <p:nvCxnSpPr>
+            <p:cNvPr id="33" name="Connecteur droit avec flèche 20">
+              <a:extLst>
+                <a:ext uri="{FF2B5EF4-FFF2-40B4-BE49-F238E27FC236}">
+                  <a16:creationId xmlns:a16="http://schemas.microsoft.com/office/drawing/2014/main" id="{1B40346D-7655-84DE-DA98-920E34DD5682}"/>
+                </a:ext>
+              </a:extLst>
+            </p:cNvPr>
+            <p:cNvCxnSpPr>
+              <a:cxnSpLocks/>
+              <a:endCxn id="32" idx="3"/>
+            </p:cNvCxnSpPr>
+            <p:nvPr/>
+          </p:nvCxnSpPr>
+          <p:spPr>
+            <a:xfrm rot="10800000">
+              <a:off x="8472264" y="1659171"/>
+              <a:ext cx="1440160" cy="1325164"/>
+            </a:xfrm>
+            <a:prstGeom prst="bentConnector3">
+              <a:avLst>
+                <a:gd name="adj1" fmla="val -154084"/>
+              </a:avLst>
+            </a:prstGeom>
+            <a:ln w="38100" cap="flat" cmpd="sng" algn="ctr">
+              <a:solidFill>
+                <a:schemeClr val="accent1"/>
+              </a:solidFill>
+              <a:prstDash val="solid"/>
+              <a:round/>
+              <a:headEnd type="none" w="med" len="med"/>
+              <a:tailEnd type="arrow" w="med" len="med"/>
+            </a:ln>
+            <a:effectLst>
+              <a:outerShdw blurRad="50800" dist="38100" dir="2700000" algn="tl" rotWithShape="0">
+                <a:prstClr val="black">
+                  <a:alpha val="40000"/>
+                </a:prstClr>
+              </a:outerShdw>
+            </a:effectLst>
+          </p:spPr>
+          <p:style>
+            <a:lnRef idx="0">
+              <a:scrgbClr r="0" g="0" b="0"/>
+            </a:lnRef>
+            <a:fillRef idx="0">
+              <a:scrgbClr r="0" g="0" b="0"/>
+            </a:fillRef>
+            <a:effectRef idx="0">
+              <a:scrgbClr r="0" g="0" b="0"/>
+            </a:effectRef>
+            <a:fontRef idx="minor">
+              <a:schemeClr val="tx1"/>
+            </a:fontRef>
+          </p:style>
+        </p:cxnSp>
+      </p:grpSp>
+    </p:spTree>
+    <p:extLst>
+      <p:ext uri="{BB962C8B-B14F-4D97-AF65-F5344CB8AC3E}">
+        <p14:creationId xmlns:p14="http://schemas.microsoft.com/office/powerpoint/2010/main" val="2247130960"/>
+      </p:ext>
+    </p:extLst>
+  </p:cSld>
+  <p:clrMapOvr>
+    <a:masterClrMapping/>
+  </p:clrMapOvr>
+  <p:timing>
+    <p:tnLst>
+      <p:par>
+        <p:cTn id="1" dur="indefinite" restart="never" nodeType="tmRoot">
+          <p:childTnLst>
+            <p:seq concurrent="1" nextAc="seek">
+              <p:cTn id="2" dur="indefinite" nodeType="mainSeq">
+                <p:childTnLst>
+                  <p:par>
+                    <p:cTn id="3" fill="hold">
+                      <p:stCondLst>
+                        <p:cond delay="indefinite"/>
+                      </p:stCondLst>
+                      <p:childTnLst>
+                        <p:par>
+                          <p:cTn id="4" fill="hold">
+                            <p:stCondLst>
+                              <p:cond delay="0"/>
+                            </p:stCondLst>
+                            <p:childTnLst>
+                              <p:par>
+                                <p:cTn id="5" presetID="1" presetClass="entr" presetSubtype="0" fill="hold" nodeType="clickEffect">
+                                  <p:stCondLst>
+                                    <p:cond delay="0"/>
+                                  </p:stCondLst>
+                                  <p:childTnLst>
+                                    <p:set>
+                                      <p:cBhvr>
+                                        <p:cTn id="6" dur="1" fill="hold">
+                                          <p:stCondLst>
+                                            <p:cond delay="0"/>
+                                          </p:stCondLst>
+                                        </p:cTn>
+                                        <p:tgtEl>
+                                          <p:spTgt spid="44"/>
+                                        </p:tgtEl>
+                                        <p:attrNameLst>
+                                          <p:attrName>style.visibility</p:attrName>
+                                        </p:attrNameLst>
+                                      </p:cBhvr>
+                                      <p:to>
+                                        <p:strVal val="visible"/>
+                                      </p:to>
+                                    </p:set>
+                                  </p:childTnLst>
+                                </p:cTn>
+                              </p:par>
+                            </p:childTnLst>
+                          </p:cTn>
+                        </p:par>
+                      </p:childTnLst>
+                    </p:cTn>
+                  </p:par>
+                  <p:par>
+                    <p:cTn id="7" fill="hold">
+                      <p:stCondLst>
+                        <p:cond delay="indefinite"/>
+                      </p:stCondLst>
+                      <p:childTnLst>
+                        <p:par>
+                          <p:cTn id="8" fill="hold">
+                            <p:stCondLst>
+                              <p:cond delay="0"/>
+                            </p:stCondLst>
+                            <p:childTnLst>
+                              <p:par>
+                                <p:cTn id="9" presetID="1" presetClass="entr" presetSubtype="0" fill="hold" nodeType="clickEffect">
+                                  <p:stCondLst>
+                                    <p:cond delay="0"/>
+                                  </p:stCondLst>
+                                  <p:childTnLst>
+                                    <p:set>
+                                      <p:cBhvr>
+                                        <p:cTn id="10" dur="1" fill="hold">
+                                          <p:stCondLst>
+                                            <p:cond delay="0"/>
+                                          </p:stCondLst>
+                                        </p:cTn>
+                                        <p:tgtEl>
+                                          <p:spTgt spid="43"/>
+                                        </p:tgtEl>
+                                        <p:attrNameLst>
+                                          <p:attrName>style.visibility</p:attrName>
+                                        </p:attrNameLst>
+                                      </p:cBhvr>
+                                      <p:to>
+                                        <p:strVal val="visible"/>
+                                      </p:to>
+                                    </p:set>
+                                  </p:childTnLst>
+                                </p:cTn>
+                              </p:par>
+                            </p:childTnLst>
+                          </p:cTn>
+                        </p:par>
+                      </p:childTnLst>
+                    </p:cTn>
+                  </p:par>
+                </p:childTnLst>
+              </p:cTn>
+              <p:prevCondLst>
+                <p:cond evt="onPrev" delay="0">
+                  <p:tgtEl>
+                    <p:sldTgt/>
+                  </p:tgtEl>
+                </p:cond>
+              </p:prevCondLst>
+              <p:nextCondLst>
+                <p:cond evt="onNext" delay="0">
+                  <p:tgtEl>
+                    <p:sldTgt/>
+                  </p:tgtEl>
+                </p:cond>
+              </p:nextCondLst>
+            </p:seq>
+          </p:childTnLst>
+        </p:cTn>
+      </p:par>
+    </p:tnLst>
+  </p:timing>
+</p:sld>
+</file>
+
+<file path=ppt/slides/slide11.xml><?xml version="1.0" encoding="utf-8"?>
+<p:sld xmlns:a="http://schemas.openxmlformats.org/drawingml/2006/main" xmlns:r="http://schemas.openxmlformats.org/officeDocument/2006/relationships" xmlns:p="http://schemas.openxmlformats.org/presentationml/2006/main">
+  <p:cSld>
+    <p:spTree>
+      <p:nvGrpSpPr>
+        <p:cNvPr id="1" name=""/>
+        <p:cNvGrpSpPr/>
+        <p:nvPr/>
+      </p:nvGrpSpPr>
+      <p:grpSpPr>
+        <a:xfrm>
+          <a:off x="0" y="0"/>
+          <a:ext cx="0" cy="0"/>
+          <a:chOff x="0" y="0"/>
+          <a:chExt cx="0" cy="0"/>
+        </a:xfrm>
+      </p:grpSpPr>
+      <p:sp>
+        <p:nvSpPr>
+          <p:cNvPr id="2" name="Titre 1">
+            <a:extLst>
+              <a:ext uri="{FF2B5EF4-FFF2-40B4-BE49-F238E27FC236}">
+                <a16:creationId xmlns:a16="http://schemas.microsoft.com/office/drawing/2014/main" id="{DAB527F2-E950-400C-4A59-58CB59CDAF3E}"/>
+              </a:ext>
+            </a:extLst>
+          </p:cNvPr>
+          <p:cNvSpPr>
+            <a:spLocks noGrp="1"/>
+          </p:cNvSpPr>
+          <p:nvPr>
+            <p:ph type="ctrTitle"/>
+          </p:nvPr>
+        </p:nvSpPr>
+        <p:spPr/>
+        <p:txBody>
+          <a:bodyPr/>
+          <a:lstStyle/>
+          <a:p>
+            <a:r>
+              <a:rPr lang="fr-FR" dirty="0"/>
+              <a:t>Programmation et Algorithmique</a:t>
+            </a:r>
+          </a:p>
+        </p:txBody>
+      </p:sp>
+      <p:sp>
+        <p:nvSpPr>
+          <p:cNvPr id="3" name="Sous-titre 2">
+            <a:extLst>
+              <a:ext uri="{FF2B5EF4-FFF2-40B4-BE49-F238E27FC236}">
+                <a16:creationId xmlns:a16="http://schemas.microsoft.com/office/drawing/2014/main" id="{571EA157-0439-E0D3-0C7A-5065A60FE6C9}"/>
+              </a:ext>
+            </a:extLst>
+          </p:cNvPr>
+          <p:cNvSpPr>
+            <a:spLocks noGrp="1"/>
+          </p:cNvSpPr>
+          <p:nvPr>
+            <p:ph type="subTitle" idx="1"/>
+          </p:nvPr>
+        </p:nvSpPr>
+        <p:spPr/>
+        <p:txBody>
+          <a:bodyPr/>
+          <a:lstStyle/>
+          <a:p>
+            <a:r>
+              <a:rPr lang="fr-FR" dirty="0"/>
+              <a:t>Introduction à Python</a:t>
+            </a:r>
+          </a:p>
+        </p:txBody>
+      </p:sp>
+    </p:spTree>
+    <p:extLst>
+      <p:ext uri="{BB962C8B-B14F-4D97-AF65-F5344CB8AC3E}">
+        <p14:creationId xmlns:p14="http://schemas.microsoft.com/office/powerpoint/2010/main" val="4213949254"/>
+      </p:ext>
+    </p:extLst>
+  </p:cSld>
+  <p:clrMapOvr>
+    <a:masterClrMapping/>
+  </p:clrMapOvr>
+</p:sld>
+</file>
+
+<file path=ppt/slides/slide12.xml><?xml version="1.0" encoding="utf-8"?>
 <p:sld xmlns:a="http://schemas.openxmlformats.org/drawingml/2006/main" xmlns:r="http://schemas.openxmlformats.org/officeDocument/2006/relationships" xmlns:p="http://schemas.openxmlformats.org/presentationml/2006/main">
   <p:cSld>
     <p:spTree>
@@ -6100,7 +7329,7 @@
 </p:sld>
 </file>
 
-<file path=ppt/slides/slide11.xml><?xml version="1.0" encoding="utf-8"?>
+<file path=ppt/slides/slide13.xml><?xml version="1.0" encoding="utf-8"?>
 <p:sld xmlns:a="http://schemas.openxmlformats.org/drawingml/2006/main" xmlns:r="http://schemas.openxmlformats.org/officeDocument/2006/relationships" xmlns:p="http://schemas.openxmlformats.org/presentationml/2006/main">
   <p:cSld>
     <p:spTree>
@@ -6247,7 +7476,7 @@
 </p:sld>
 </file>
 
-<file path=ppt/slides/slide12.xml><?xml version="1.0" encoding="utf-8"?>
+<file path=ppt/slides/slide14.xml><?xml version="1.0" encoding="utf-8"?>
 <p:sld xmlns:a="http://schemas.openxmlformats.org/drawingml/2006/main" xmlns:r="http://schemas.openxmlformats.org/officeDocument/2006/relationships" xmlns:p="http://schemas.openxmlformats.org/presentationml/2006/main">
   <p:cSld>
     <p:spTree>
@@ -6432,7 +7661,7 @@
 </p:sld>
 </file>
 
-<file path=ppt/slides/slide13.xml><?xml version="1.0" encoding="utf-8"?>
+<file path=ppt/slides/slide15.xml><?xml version="1.0" encoding="utf-8"?>
 <p:sld xmlns:a="http://schemas.openxmlformats.org/drawingml/2006/main" xmlns:r="http://schemas.openxmlformats.org/officeDocument/2006/relationships" xmlns:p="http://schemas.openxmlformats.org/presentationml/2006/main">
   <p:cSld>
     <p:spTree>
@@ -6698,7 +7927,7 @@
           <p:cNvPr id="2" name="Titre 1">
             <a:extLst>
               <a:ext uri="{FF2B5EF4-FFF2-40B4-BE49-F238E27FC236}">
-                <a16:creationId xmlns:a16="http://schemas.microsoft.com/office/drawing/2014/main" id="{4F12B3F6-A5E7-7393-85E9-A052137D4354}"/>
+                <a16:creationId xmlns:a16="http://schemas.microsoft.com/office/drawing/2014/main" id="{BD25FEB6-DFA0-62FE-EB84-7EAF445ADA15}"/>
               </a:ext>
             </a:extLst>
           </p:cNvPr>
@@ -6716,7 +7945,7 @@
           <a:p>
             <a:r>
               <a:rPr lang="fr-FR" dirty="0"/>
-              <a:t>8 thématiques : Python + 7 thèmes</a:t>
+              <a:t>Apport de l’informatique, de la programmation ? </a:t>
             </a:r>
           </a:p>
         </p:txBody>
@@ -6726,7 +7955,7 @@
           <p:cNvPr id="3" name="Espace réservé du contenu 2">
             <a:extLst>
               <a:ext uri="{FF2B5EF4-FFF2-40B4-BE49-F238E27FC236}">
-                <a16:creationId xmlns:a16="http://schemas.microsoft.com/office/drawing/2014/main" id="{14970134-5EAA-A166-642A-38BBDA847464}"/>
+                <a16:creationId xmlns:a16="http://schemas.microsoft.com/office/drawing/2014/main" id="{A42EA520-924A-BE96-9222-4F9E638AE724}"/>
               </a:ext>
             </a:extLst>
           </p:cNvPr>
@@ -6739,71 +7968,47 @@
         </p:nvSpPr>
         <p:spPr/>
         <p:txBody>
-          <a:bodyPr/>
+          <a:bodyPr>
+            <a:normAutofit/>
+          </a:bodyPr>
           <a:lstStyle/>
           <a:p>
             <a:r>
               <a:rPr lang="fr-FR" dirty="0"/>
-              <a:t>Un thème transverse : programmation (en python) et algorithmique</a:t>
-            </a:r>
-          </a:p>
-          <a:p>
-            <a:r>
-              <a:rPr lang="fr-FR" dirty="0"/>
-              <a:t>7 thèmes :</a:t>
-            </a:r>
-          </a:p>
-          <a:p>
-            <a:pPr lvl="1"/>
-            <a:r>
-              <a:rPr lang="fr-FR" dirty="0"/>
-              <a:t>Les données structurées et leur traitement</a:t>
-            </a:r>
-          </a:p>
-          <a:p>
-            <a:pPr lvl="1"/>
-            <a:r>
-              <a:rPr lang="fr-FR" dirty="0"/>
-              <a:t>Web</a:t>
-            </a:r>
-          </a:p>
-          <a:p>
-            <a:pPr lvl="1"/>
-            <a:r>
-              <a:rPr lang="fr-FR" dirty="0"/>
-              <a:t>Localisation, cartographie et mobilité</a:t>
-            </a:r>
-          </a:p>
-          <a:p>
-            <a:pPr lvl="1"/>
-            <a:r>
-              <a:rPr lang="fr-FR" dirty="0"/>
-              <a:t>Informatique embarquée et objets connectés</a:t>
-            </a:r>
-          </a:p>
-          <a:p>
-            <a:pPr lvl="1"/>
-            <a:r>
-              <a:rPr lang="fr-FR" dirty="0"/>
-              <a:t>Internet</a:t>
-            </a:r>
-          </a:p>
-          <a:p>
-            <a:pPr lvl="1"/>
-            <a:r>
-              <a:rPr lang="fr-FR" dirty="0"/>
-              <a:t>Réseaux sociaux</a:t>
-            </a:r>
-          </a:p>
-          <a:p>
-            <a:pPr lvl="1"/>
-            <a:r>
-              <a:rPr lang="fr-FR" dirty="0"/>
-              <a:t>La photographie numérique </a:t>
-            </a:r>
-          </a:p>
-          <a:p>
-            <a:pPr lvl="1"/>
+              <a:t>Gain de confort (moins de tâches rébarbatives ou peu intéressantes)</a:t>
+            </a:r>
+          </a:p>
+          <a:p>
+            <a:r>
+              <a:rPr lang="fr-FR" dirty="0"/>
+              <a:t>Gain de temps (temps d’exécution, 24h/24)</a:t>
+            </a:r>
+          </a:p>
+          <a:p>
+            <a:r>
+              <a:rPr lang="fr-FR" dirty="0"/>
+              <a:t>Gain de précision (moins d’erreurs humaines)</a:t>
+            </a:r>
+          </a:p>
+          <a:p>
+            <a:r>
+              <a:rPr lang="fr-FR" dirty="0"/>
+              <a:t>Gain de place (information numérique vs papier), d’échange/de partage, de sauvegarde</a:t>
+            </a:r>
+          </a:p>
+          <a:p>
+            <a:r>
+              <a:rPr lang="fr-FR" dirty="0"/>
+              <a:t>Gain économique (pour tous les gains)</a:t>
+            </a:r>
+          </a:p>
+          <a:p>
+            <a:r>
+              <a:rPr lang="fr-FR" dirty="0"/>
+              <a:t>Questions sociétales et philosophiques </a:t>
+            </a:r>
+          </a:p>
+          <a:p>
             <a:endParaRPr lang="fr-FR" dirty="0"/>
           </a:p>
         </p:txBody>
@@ -6811,7 +8016,7 @@
     </p:spTree>
     <p:extLst>
       <p:ext uri="{BB962C8B-B14F-4D97-AF65-F5344CB8AC3E}">
-        <p14:creationId xmlns:p14="http://schemas.microsoft.com/office/powerpoint/2010/main" val="1922980709"/>
+        <p14:creationId xmlns:p14="http://schemas.microsoft.com/office/powerpoint/2010/main" val="4130174644"/>
       </p:ext>
     </p:extLst>
   </p:cSld>
@@ -6843,7 +8048,7 @@
           <p:cNvPr id="2" name="Titre 1">
             <a:extLst>
               <a:ext uri="{FF2B5EF4-FFF2-40B4-BE49-F238E27FC236}">
-                <a16:creationId xmlns:a16="http://schemas.microsoft.com/office/drawing/2014/main" id="{21A1EA38-BB8B-1112-07A3-A92E057BF6C1}"/>
+                <a16:creationId xmlns:a16="http://schemas.microsoft.com/office/drawing/2014/main" id="{BD25FEB6-DFA0-62FE-EB84-7EAF445ADA15}"/>
               </a:ext>
             </a:extLst>
           </p:cNvPr>
@@ -6861,7 +8066,7 @@
           <a:p>
             <a:r>
               <a:rPr lang="fr-FR" dirty="0"/>
-              <a:t>Fonctionnement des séances</a:t>
+              <a:t>Caractéristique de La programmation </a:t>
             </a:r>
           </a:p>
         </p:txBody>
@@ -6871,7 +8076,237 @@
           <p:cNvPr id="3" name="Espace réservé du contenu 2">
             <a:extLst>
               <a:ext uri="{FF2B5EF4-FFF2-40B4-BE49-F238E27FC236}">
-                <a16:creationId xmlns:a16="http://schemas.microsoft.com/office/drawing/2014/main" id="{725B29D7-223D-D9F9-1C22-E733FB91EB7E}"/>
+                <a16:creationId xmlns:a16="http://schemas.microsoft.com/office/drawing/2014/main" id="{A42EA520-924A-BE96-9222-4F9E638AE724}"/>
+              </a:ext>
+            </a:extLst>
+          </p:cNvPr>
+          <p:cNvSpPr>
+            <a:spLocks noGrp="1"/>
+          </p:cNvSpPr>
+          <p:nvPr>
+            <p:ph idx="1"/>
+          </p:nvPr>
+        </p:nvSpPr>
+        <p:spPr/>
+        <p:txBody>
+          <a:bodyPr>
+            <a:normAutofit/>
+          </a:bodyPr>
+          <a:lstStyle/>
+          <a:p>
+            <a:r>
+              <a:rPr lang="fr-FR" dirty="0"/>
+              <a:t>Logique : définir un comportement automatisé : Esprit scientifique / ingénieur</a:t>
+            </a:r>
+          </a:p>
+          <a:p>
+            <a:r>
+              <a:rPr lang="fr-FR" dirty="0"/>
+              <a:t>Créativité : trouver des solutions, inventer, « design » (Interface Humain-Machine)</a:t>
+            </a:r>
+          </a:p>
+          <a:p>
+            <a:r>
+              <a:rPr lang="fr-FR" dirty="0"/>
+              <a:t>Plusieurs niveaux d’abstraction : organisation du code (architecture logicielle), différents niveaux de programmation (proche du matériel, proche des </a:t>
+            </a:r>
+            <a:r>
+              <a:rPr lang="fr-FR" dirty="0" err="1"/>
+              <a:t>utilisat·rice·s</a:t>
+            </a:r>
+            <a:r>
+              <a:rPr lang="fr-FR" dirty="0"/>
+              <a:t>, communication entre ordinateur, etc.)</a:t>
+            </a:r>
+          </a:p>
+          <a:p>
+            <a:r>
+              <a:rPr lang="fr-FR" dirty="0"/>
+              <a:t>En constante évolution (langage, façon de programmer, technologie)</a:t>
+            </a:r>
+          </a:p>
+          <a:p>
+            <a:pPr marL="457200" lvl="1" indent="0">
+              <a:buNone/>
+            </a:pPr>
+            <a:endParaRPr lang="fr-FR" dirty="0"/>
+          </a:p>
+          <a:p>
+            <a:endParaRPr lang="fr-FR" dirty="0"/>
+          </a:p>
+        </p:txBody>
+      </p:sp>
+    </p:spTree>
+    <p:extLst>
+      <p:ext uri="{BB962C8B-B14F-4D97-AF65-F5344CB8AC3E}">
+        <p14:creationId xmlns:p14="http://schemas.microsoft.com/office/powerpoint/2010/main" val="1989062559"/>
+      </p:ext>
+    </p:extLst>
+  </p:cSld>
+  <p:clrMapOvr>
+    <a:masterClrMapping/>
+  </p:clrMapOvr>
+</p:sld>
+</file>
+
+<file path=ppt/slides/slide5.xml><?xml version="1.0" encoding="utf-8"?>
+<p:sld xmlns:a="http://schemas.openxmlformats.org/drawingml/2006/main" xmlns:r="http://schemas.openxmlformats.org/officeDocument/2006/relationships" xmlns:p="http://schemas.openxmlformats.org/presentationml/2006/main">
+  <p:cSld>
+    <p:spTree>
+      <p:nvGrpSpPr>
+        <p:cNvPr id="1" name=""/>
+        <p:cNvGrpSpPr/>
+        <p:nvPr/>
+      </p:nvGrpSpPr>
+      <p:grpSpPr>
+        <a:xfrm>
+          <a:off x="0" y="0"/>
+          <a:ext cx="0" cy="0"/>
+          <a:chOff x="0" y="0"/>
+          <a:chExt cx="0" cy="0"/>
+        </a:xfrm>
+      </p:grpSpPr>
+      <p:sp>
+        <p:nvSpPr>
+          <p:cNvPr id="2" name="Titre 1">
+            <a:extLst>
+              <a:ext uri="{FF2B5EF4-FFF2-40B4-BE49-F238E27FC236}">
+                <a16:creationId xmlns:a16="http://schemas.microsoft.com/office/drawing/2014/main" id="{BD25FEB6-DFA0-62FE-EB84-7EAF445ADA15}"/>
+              </a:ext>
+            </a:extLst>
+          </p:cNvPr>
+          <p:cNvSpPr>
+            <a:spLocks noGrp="1"/>
+          </p:cNvSpPr>
+          <p:nvPr>
+            <p:ph type="title"/>
+          </p:nvPr>
+        </p:nvSpPr>
+        <p:spPr/>
+        <p:txBody>
+          <a:bodyPr/>
+          <a:lstStyle/>
+          <a:p>
+            <a:r>
+              <a:rPr lang="fr-FR" dirty="0"/>
+              <a:t>Pourquoi apprendre la programmation ?</a:t>
+            </a:r>
+          </a:p>
+        </p:txBody>
+      </p:sp>
+      <p:sp>
+        <p:nvSpPr>
+          <p:cNvPr id="3" name="Espace réservé du contenu 2">
+            <a:extLst>
+              <a:ext uri="{FF2B5EF4-FFF2-40B4-BE49-F238E27FC236}">
+                <a16:creationId xmlns:a16="http://schemas.microsoft.com/office/drawing/2014/main" id="{A42EA520-924A-BE96-9222-4F9E638AE724}"/>
+              </a:ext>
+            </a:extLst>
+          </p:cNvPr>
+          <p:cNvSpPr>
+            <a:spLocks noGrp="1"/>
+          </p:cNvSpPr>
+          <p:nvPr>
+            <p:ph idx="1"/>
+          </p:nvPr>
+        </p:nvSpPr>
+        <p:spPr/>
+        <p:txBody>
+          <a:bodyPr>
+            <a:normAutofit/>
+          </a:bodyPr>
+          <a:lstStyle/>
+          <a:p>
+            <a:r>
+              <a:rPr lang="fr-FR" dirty="0"/>
+              <a:t>Monde de plus en plus informatisé (maison « intelligente », web, etc.)</a:t>
+            </a:r>
+          </a:p>
+          <a:p>
+            <a:r>
+              <a:rPr lang="fr-FR" dirty="0"/>
+              <a:t>Métier de plus en plus informatisé  </a:t>
+            </a:r>
+          </a:p>
+          <a:p>
+            <a:r>
+              <a:rPr lang="fr-FR" dirty="0"/>
+              <a:t>Études de plus en plus informatisé</a:t>
+            </a:r>
+          </a:p>
+          <a:p>
+            <a:pPr lvl="1"/>
+            <a:endParaRPr lang="fr-FR" dirty="0"/>
+          </a:p>
+          <a:p>
+            <a:endParaRPr lang="fr-FR" dirty="0"/>
+          </a:p>
+        </p:txBody>
+      </p:sp>
+    </p:spTree>
+    <p:extLst>
+      <p:ext uri="{BB962C8B-B14F-4D97-AF65-F5344CB8AC3E}">
+        <p14:creationId xmlns:p14="http://schemas.microsoft.com/office/powerpoint/2010/main" val="206426265"/>
+      </p:ext>
+    </p:extLst>
+  </p:cSld>
+  <p:clrMapOvr>
+    <a:masterClrMapping/>
+  </p:clrMapOvr>
+</p:sld>
+</file>
+
+<file path=ppt/slides/slide6.xml><?xml version="1.0" encoding="utf-8"?>
+<p:sld xmlns:a="http://schemas.openxmlformats.org/drawingml/2006/main" xmlns:r="http://schemas.openxmlformats.org/officeDocument/2006/relationships" xmlns:p="http://schemas.openxmlformats.org/presentationml/2006/main">
+  <p:cSld>
+    <p:spTree>
+      <p:nvGrpSpPr>
+        <p:cNvPr id="1" name=""/>
+        <p:cNvGrpSpPr/>
+        <p:nvPr/>
+      </p:nvGrpSpPr>
+      <p:grpSpPr>
+        <a:xfrm>
+          <a:off x="0" y="0"/>
+          <a:ext cx="0" cy="0"/>
+          <a:chOff x="0" y="0"/>
+          <a:chExt cx="0" cy="0"/>
+        </a:xfrm>
+      </p:grpSpPr>
+      <p:sp>
+        <p:nvSpPr>
+          <p:cNvPr id="2" name="Titre 1">
+            <a:extLst>
+              <a:ext uri="{FF2B5EF4-FFF2-40B4-BE49-F238E27FC236}">
+                <a16:creationId xmlns:a16="http://schemas.microsoft.com/office/drawing/2014/main" id="{4F12B3F6-A5E7-7393-85E9-A052137D4354}"/>
+              </a:ext>
+            </a:extLst>
+          </p:cNvPr>
+          <p:cNvSpPr>
+            <a:spLocks noGrp="1"/>
+          </p:cNvSpPr>
+          <p:nvPr>
+            <p:ph type="title"/>
+          </p:nvPr>
+        </p:nvSpPr>
+        <p:spPr/>
+        <p:txBody>
+          <a:bodyPr/>
+          <a:lstStyle/>
+          <a:p>
+            <a:r>
+              <a:rPr lang="fr-FR" dirty="0"/>
+              <a:t>8 thématiques : Python + 7 thèmes</a:t>
+            </a:r>
+          </a:p>
+        </p:txBody>
+      </p:sp>
+      <p:sp>
+        <p:nvSpPr>
+          <p:cNvPr id="3" name="Espace réservé du contenu 2">
+            <a:extLst>
+              <a:ext uri="{FF2B5EF4-FFF2-40B4-BE49-F238E27FC236}">
+                <a16:creationId xmlns:a16="http://schemas.microsoft.com/office/drawing/2014/main" id="{14970134-5EAA-A166-642A-38BBDA847464}"/>
               </a:ext>
             </a:extLst>
           </p:cNvPr>
@@ -6889,49 +8324,74 @@
           <a:p>
             <a:r>
               <a:rPr lang="fr-FR" dirty="0"/>
-              <a:t>Découpage par ½ heure : cours / activité (parfois des activités sur 1h)</a:t>
+              <a:t>Un thème transverse : programmation (en python) et algorithmique</a:t>
+            </a:r>
+          </a:p>
+          <a:p>
+            <a:r>
+              <a:rPr lang="fr-FR" dirty="0"/>
+              <a:t>7 thèmes :</a:t>
             </a:r>
           </a:p>
           <a:p>
             <a:pPr lvl="1"/>
             <a:r>
               <a:rPr lang="fr-FR" dirty="0"/>
-              <a:t>3 « créneaux » par séance</a:t>
-            </a:r>
-          </a:p>
-          <a:p>
-            <a:r>
-              <a:rPr lang="fr-FR" dirty="0"/>
-              <a:t>Environ 4 semaines par thématiques</a:t>
+              <a:t>Les données structurées et leur traitement</a:t>
             </a:r>
           </a:p>
           <a:p>
             <a:pPr lvl="1"/>
             <a:r>
               <a:rPr lang="fr-FR" dirty="0"/>
-              <a:t>Un QCM (« court »), coefficient 1, en milieu de thématique</a:t>
+              <a:t>Web</a:t>
             </a:r>
           </a:p>
           <a:p>
             <a:pPr lvl="1"/>
             <a:r>
               <a:rPr lang="fr-FR" dirty="0"/>
-              <a:t>Un QCM, coefficient 2, en fin de thématique</a:t>
+              <a:t>Localisation, cartographie et mobilité</a:t>
             </a:r>
           </a:p>
           <a:p>
             <a:pPr lvl="1"/>
             <a:r>
               <a:rPr lang="fr-FR" dirty="0"/>
-              <a:t>Soit un qcm toutes les deux-trois semaines</a:t>
-            </a:r>
+              <a:t>Informatique embarquée et objets connectés</a:t>
+            </a:r>
+          </a:p>
+          <a:p>
+            <a:pPr lvl="1"/>
+            <a:r>
+              <a:rPr lang="fr-FR" dirty="0"/>
+              <a:t>Internet</a:t>
+            </a:r>
+          </a:p>
+          <a:p>
+            <a:pPr lvl="1"/>
+            <a:r>
+              <a:rPr lang="fr-FR" dirty="0"/>
+              <a:t>Réseaux sociaux</a:t>
+            </a:r>
+          </a:p>
+          <a:p>
+            <a:pPr lvl="1"/>
+            <a:r>
+              <a:rPr lang="fr-FR" dirty="0"/>
+              <a:t>La photographie numérique </a:t>
+            </a:r>
+          </a:p>
+          <a:p>
+            <a:pPr lvl="1"/>
+            <a:endParaRPr lang="fr-FR" dirty="0"/>
           </a:p>
         </p:txBody>
       </p:sp>
     </p:spTree>
     <p:extLst>
       <p:ext uri="{BB962C8B-B14F-4D97-AF65-F5344CB8AC3E}">
-        <p14:creationId xmlns:p14="http://schemas.microsoft.com/office/powerpoint/2010/main" val="3925285634"/>
+        <p14:creationId xmlns:p14="http://schemas.microsoft.com/office/powerpoint/2010/main" val="1922980709"/>
       </p:ext>
     </p:extLst>
   </p:cSld>
@@ -6941,7 +8401,7 @@
 </p:sld>
 </file>
 
-<file path=ppt/slides/slide5.xml><?xml version="1.0" encoding="utf-8"?>
+<file path=ppt/slides/slide7.xml><?xml version="1.0" encoding="utf-8"?>
 <p:sld xmlns:a="http://schemas.openxmlformats.org/drawingml/2006/main" xmlns:r="http://schemas.openxmlformats.org/officeDocument/2006/relationships" xmlns:p="http://schemas.openxmlformats.org/presentationml/2006/main">
   <p:cSld>
     <p:spTree>
@@ -7027,7 +8487,7 @@
 </p:sld>
 </file>
 
-<file path=ppt/slides/slide6.xml><?xml version="1.0" encoding="utf-8"?>
+<file path=ppt/slides/slide8.xml><?xml version="1.0" encoding="utf-8"?>
 <p:sld xmlns:a="http://schemas.openxmlformats.org/drawingml/2006/main" xmlns:r="http://schemas.openxmlformats.org/officeDocument/2006/relationships" xmlns:p="http://schemas.openxmlformats.org/presentationml/2006/main">
   <p:cSld>
     <p:spTree>
@@ -7207,7 +8667,7 @@
 </p:sld>
 </file>
 
-<file path=ppt/slides/slide7.xml><?xml version="1.0" encoding="utf-8"?>
+<file path=ppt/slides/slide9.xml><?xml version="1.0" encoding="utf-8"?>
 <p:sld xmlns:a="http://schemas.openxmlformats.org/drawingml/2006/main" xmlns:r="http://schemas.openxmlformats.org/officeDocument/2006/relationships" xmlns:p="http://schemas.openxmlformats.org/presentationml/2006/main">
   <p:cSld>
     <p:spTree>
@@ -7404,274 +8864,6 @@
     <p:extLst>
       <p:ext uri="{BB962C8B-B14F-4D97-AF65-F5344CB8AC3E}">
         <p14:creationId xmlns:p14="http://schemas.microsoft.com/office/powerpoint/2010/main" val="838894097"/>
-      </p:ext>
-    </p:extLst>
-  </p:cSld>
-  <p:clrMapOvr>
-    <a:masterClrMapping/>
-  </p:clrMapOvr>
-</p:sld>
-</file>
-
-<file path=ppt/slides/slide8.xml><?xml version="1.0" encoding="utf-8"?>
-<p:sld xmlns:a="http://schemas.openxmlformats.org/drawingml/2006/main" xmlns:r="http://schemas.openxmlformats.org/officeDocument/2006/relationships" xmlns:p="http://schemas.openxmlformats.org/presentationml/2006/main">
-  <p:cSld>
-    <p:spTree>
-      <p:nvGrpSpPr>
-        <p:cNvPr id="1" name=""/>
-        <p:cNvGrpSpPr/>
-        <p:nvPr/>
-      </p:nvGrpSpPr>
-      <p:grpSpPr>
-        <a:xfrm>
-          <a:off x="0" y="0"/>
-          <a:ext cx="0" cy="0"/>
-          <a:chOff x="0" y="0"/>
-          <a:chExt cx="0" cy="0"/>
-        </a:xfrm>
-      </p:grpSpPr>
-      <p:sp>
-        <p:nvSpPr>
-          <p:cNvPr id="2" name="Titre 1">
-            <a:extLst>
-              <a:ext uri="{FF2B5EF4-FFF2-40B4-BE49-F238E27FC236}">
-                <a16:creationId xmlns:a16="http://schemas.microsoft.com/office/drawing/2014/main" id="{F3DF8774-D071-A019-761C-998EA92C32A3}"/>
-              </a:ext>
-            </a:extLst>
-          </p:cNvPr>
-          <p:cNvSpPr>
-            <a:spLocks noGrp="1"/>
-          </p:cNvSpPr>
-          <p:nvPr>
-            <p:ph type="title"/>
-          </p:nvPr>
-        </p:nvSpPr>
-        <p:spPr/>
-        <p:txBody>
-          <a:bodyPr>
-            <a:normAutofit/>
-          </a:bodyPr>
-          <a:lstStyle/>
-          <a:p>
-            <a:r>
-              <a:rPr lang="fr-FR" dirty="0"/>
-              <a:t>Spécialisation dans l’informatique</a:t>
-            </a:r>
-            <a:br>
-              <a:rPr lang="fr-FR" dirty="0"/>
-            </a:br>
-            <a:r>
-              <a:rPr lang="fr-FR" sz="2000" dirty="0"/>
-              <a:t>source : https://cnu27.ls2n.fr/nomenclature-thematique-de-la-section-27-du-cnu/</a:t>
-            </a:r>
-            <a:endParaRPr lang="fr-FR" dirty="0"/>
-          </a:p>
-        </p:txBody>
-      </p:sp>
-      <p:sp>
-        <p:nvSpPr>
-          <p:cNvPr id="3" name="Espace réservé du contenu 2">
-            <a:extLst>
-              <a:ext uri="{FF2B5EF4-FFF2-40B4-BE49-F238E27FC236}">
-                <a16:creationId xmlns:a16="http://schemas.microsoft.com/office/drawing/2014/main" id="{85C1C42F-7C28-14D4-3047-0EA1F60582B5}"/>
-              </a:ext>
-            </a:extLst>
-          </p:cNvPr>
-          <p:cNvSpPr>
-            <a:spLocks noGrp="1"/>
-          </p:cNvSpPr>
-          <p:nvPr>
-            <p:ph idx="1"/>
-          </p:nvPr>
-        </p:nvSpPr>
-        <p:spPr/>
-        <p:txBody>
-          <a:bodyPr>
-            <a:normAutofit fontScale="62500" lnSpcReduction="20000"/>
-          </a:bodyPr>
-          <a:lstStyle/>
-          <a:p>
-            <a:r>
-              <a:rPr lang="fr-FR" dirty="0"/>
-              <a:t>Système d’information (Base de données, Web, Web service, cloud, etc.)</a:t>
-            </a:r>
-          </a:p>
-          <a:p>
-            <a:r>
-              <a:rPr lang="fr-FR" dirty="0"/>
-              <a:t>Algorithmique, Recherche Opérationnelle (optimisation, complexité, etc.)</a:t>
-            </a:r>
-          </a:p>
-          <a:p>
-            <a:r>
-              <a:rPr lang="fr-FR" dirty="0"/>
-              <a:t>Informatique fondamentale (théories, informatique quantique, etc.)</a:t>
-            </a:r>
-          </a:p>
-          <a:p>
-            <a:r>
-              <a:rPr lang="fr-FR" dirty="0"/>
-              <a:t>Réseaux (architecture des réseaux, Internet des Objets (IoT), mobilité, cloud, etc.)</a:t>
-            </a:r>
-          </a:p>
-          <a:p>
-            <a:r>
-              <a:rPr lang="fr-FR" dirty="0" err="1"/>
-              <a:t>Bioinformatique</a:t>
-            </a:r>
-            <a:r>
-              <a:rPr lang="fr-FR" dirty="0"/>
-              <a:t> (fouille de données, modèles et simulations, etc.)</a:t>
-            </a:r>
-          </a:p>
-          <a:p>
-            <a:r>
-              <a:rPr lang="fr-FR" dirty="0"/>
-              <a:t>Systèmes Informatiques (système d’exploitation, temps réels, distribués, etc.)</a:t>
-            </a:r>
-          </a:p>
-          <a:p>
-            <a:r>
-              <a:rPr lang="fr-FR" dirty="0"/>
-              <a:t>Génie logiciel (analyse et conception, modèle, tests, architecture logicielle, </a:t>
-            </a:r>
-            <a:r>
-              <a:rPr lang="fr-FR" dirty="0" err="1"/>
-              <a:t>devops</a:t>
-            </a:r>
-            <a:r>
-              <a:rPr lang="fr-FR" dirty="0"/>
-              <a:t>, etc.)</a:t>
-            </a:r>
-          </a:p>
-          <a:p>
-            <a:r>
-              <a:rPr lang="fr-FR" dirty="0"/>
-              <a:t>Intelligence Artificielle (apprentissage, TALN, science des données, etc.)</a:t>
-            </a:r>
-          </a:p>
-          <a:p>
-            <a:r>
-              <a:rPr lang="fr-FR" dirty="0"/>
-              <a:t>Image, Vision/Perception par ordinateur, RA/RV, 3D, etc.</a:t>
-            </a:r>
-          </a:p>
-          <a:p>
-            <a:r>
-              <a:rPr lang="fr-FR" dirty="0"/>
-              <a:t>Communication Humain-Machine (IHM, Environnements informatiques pour l’apprentissage humain, etc.)</a:t>
-            </a:r>
-          </a:p>
-          <a:p>
-            <a:r>
-              <a:rPr lang="fr-FR" dirty="0"/>
-              <a:t>Architecture des machines (processeurs, systèmes de mémoire, systèmes embarqués, etc.)</a:t>
-            </a:r>
-          </a:p>
-          <a:p>
-            <a:r>
-              <a:rPr lang="fr-FR" dirty="0"/>
-              <a:t>Sécurité (cryptographie, protection de la vie privée, etc.)</a:t>
-            </a:r>
-          </a:p>
-          <a:p>
-            <a:r>
-              <a:rPr lang="fr-FR" dirty="0"/>
-              <a:t>+ Informatique Industrielle + Modélisation-simulation</a:t>
-            </a:r>
-          </a:p>
-        </p:txBody>
-      </p:sp>
-    </p:spTree>
-    <p:extLst>
-      <p:ext uri="{BB962C8B-B14F-4D97-AF65-F5344CB8AC3E}">
-        <p14:creationId xmlns:p14="http://schemas.microsoft.com/office/powerpoint/2010/main" val="2247130960"/>
-      </p:ext>
-    </p:extLst>
-  </p:cSld>
-  <p:clrMapOvr>
-    <a:masterClrMapping/>
-  </p:clrMapOvr>
-</p:sld>
-</file>
-
-<file path=ppt/slides/slide9.xml><?xml version="1.0" encoding="utf-8"?>
-<p:sld xmlns:a="http://schemas.openxmlformats.org/drawingml/2006/main" xmlns:r="http://schemas.openxmlformats.org/officeDocument/2006/relationships" xmlns:p="http://schemas.openxmlformats.org/presentationml/2006/main">
-  <p:cSld>
-    <p:spTree>
-      <p:nvGrpSpPr>
-        <p:cNvPr id="1" name=""/>
-        <p:cNvGrpSpPr/>
-        <p:nvPr/>
-      </p:nvGrpSpPr>
-      <p:grpSpPr>
-        <a:xfrm>
-          <a:off x="0" y="0"/>
-          <a:ext cx="0" cy="0"/>
-          <a:chOff x="0" y="0"/>
-          <a:chExt cx="0" cy="0"/>
-        </a:xfrm>
-      </p:grpSpPr>
-      <p:sp>
-        <p:nvSpPr>
-          <p:cNvPr id="2" name="Titre 1">
-            <a:extLst>
-              <a:ext uri="{FF2B5EF4-FFF2-40B4-BE49-F238E27FC236}">
-                <a16:creationId xmlns:a16="http://schemas.microsoft.com/office/drawing/2014/main" id="{DAB527F2-E950-400C-4A59-58CB59CDAF3E}"/>
-              </a:ext>
-            </a:extLst>
-          </p:cNvPr>
-          <p:cNvSpPr>
-            <a:spLocks noGrp="1"/>
-          </p:cNvSpPr>
-          <p:nvPr>
-            <p:ph type="ctrTitle"/>
-          </p:nvPr>
-        </p:nvSpPr>
-        <p:spPr/>
-        <p:txBody>
-          <a:bodyPr/>
-          <a:lstStyle/>
-          <a:p>
-            <a:r>
-              <a:rPr lang="fr-FR" dirty="0"/>
-              <a:t>Programmation et Algorithmique</a:t>
-            </a:r>
-          </a:p>
-        </p:txBody>
-      </p:sp>
-      <p:sp>
-        <p:nvSpPr>
-          <p:cNvPr id="3" name="Sous-titre 2">
-            <a:extLst>
-              <a:ext uri="{FF2B5EF4-FFF2-40B4-BE49-F238E27FC236}">
-                <a16:creationId xmlns:a16="http://schemas.microsoft.com/office/drawing/2014/main" id="{571EA157-0439-E0D3-0C7A-5065A60FE6C9}"/>
-              </a:ext>
-            </a:extLst>
-          </p:cNvPr>
-          <p:cNvSpPr>
-            <a:spLocks noGrp="1"/>
-          </p:cNvSpPr>
-          <p:nvPr>
-            <p:ph type="subTitle" idx="1"/>
-          </p:nvPr>
-        </p:nvSpPr>
-        <p:spPr/>
-        <p:txBody>
-          <a:bodyPr/>
-          <a:lstStyle/>
-          <a:p>
-            <a:r>
-              <a:rPr lang="fr-FR" dirty="0"/>
-              <a:t>Introduction à Python</a:t>
-            </a:r>
-          </a:p>
-        </p:txBody>
-      </p:sp>
-    </p:spTree>
-    <p:extLst>
-      <p:ext uri="{BB962C8B-B14F-4D97-AF65-F5344CB8AC3E}">
-        <p14:creationId xmlns:p14="http://schemas.microsoft.com/office/powerpoint/2010/main" val="4213949254"/>
       </p:ext>
     </p:extLst>
   </p:cSld>

</xml_diff>